<commit_message>
Updated poster to final version
</commit_message>
<xml_diff>
--- a/Data portfolio/DataPortfolio_G11-2750590_FishOil.pptx
+++ b/Data portfolio/DataPortfolio_G11-2750590_FishOil.pptx
@@ -243,7 +243,7 @@
           <a:p>
             <a:fld id="{31F8AD08-5319-9B49-8237-A1F2CE8B613E}" type="datetimeFigureOut">
               <a:rPr lang="en-US" smtClean="0"/>
-              <a:t>9/1/20</a:t>
+              <a:t>22-Oct-21</a:t>
             </a:fld>
             <a:endParaRPr lang="en-US"/>
           </a:p>
@@ -413,7 +413,7 @@
           <a:p>
             <a:fld id="{31F8AD08-5319-9B49-8237-A1F2CE8B613E}" type="datetimeFigureOut">
               <a:rPr lang="en-US" smtClean="0"/>
-              <a:t>9/1/20</a:t>
+              <a:t>22-Oct-21</a:t>
             </a:fld>
             <a:endParaRPr lang="en-US"/>
           </a:p>
@@ -593,7 +593,7 @@
           <a:p>
             <a:fld id="{31F8AD08-5319-9B49-8237-A1F2CE8B613E}" type="datetimeFigureOut">
               <a:rPr lang="en-US" smtClean="0"/>
-              <a:t>9/1/20</a:t>
+              <a:t>22-Oct-21</a:t>
             </a:fld>
             <a:endParaRPr lang="en-US"/>
           </a:p>
@@ -763,7 +763,7 @@
           <a:p>
             <a:fld id="{31F8AD08-5319-9B49-8237-A1F2CE8B613E}" type="datetimeFigureOut">
               <a:rPr lang="en-US" smtClean="0"/>
-              <a:t>9/1/20</a:t>
+              <a:t>22-Oct-21</a:t>
             </a:fld>
             <a:endParaRPr lang="en-US"/>
           </a:p>
@@ -1007,7 +1007,7 @@
           <a:p>
             <a:fld id="{31F8AD08-5319-9B49-8237-A1F2CE8B613E}" type="datetimeFigureOut">
               <a:rPr lang="en-US" smtClean="0"/>
-              <a:t>9/1/20</a:t>
+              <a:t>22-Oct-21</a:t>
             </a:fld>
             <a:endParaRPr lang="en-US"/>
           </a:p>
@@ -1239,7 +1239,7 @@
           <a:p>
             <a:fld id="{31F8AD08-5319-9B49-8237-A1F2CE8B613E}" type="datetimeFigureOut">
               <a:rPr lang="en-US" smtClean="0"/>
-              <a:t>9/1/20</a:t>
+              <a:t>22-Oct-21</a:t>
             </a:fld>
             <a:endParaRPr lang="en-US"/>
           </a:p>
@@ -1606,7 +1606,7 @@
           <a:p>
             <a:fld id="{31F8AD08-5319-9B49-8237-A1F2CE8B613E}" type="datetimeFigureOut">
               <a:rPr lang="en-US" smtClean="0"/>
-              <a:t>9/1/20</a:t>
+              <a:t>22-Oct-21</a:t>
             </a:fld>
             <a:endParaRPr lang="en-US"/>
           </a:p>
@@ -1724,7 +1724,7 @@
           <a:p>
             <a:fld id="{31F8AD08-5319-9B49-8237-A1F2CE8B613E}" type="datetimeFigureOut">
               <a:rPr lang="en-US" smtClean="0"/>
-              <a:t>9/1/20</a:t>
+              <a:t>22-Oct-21</a:t>
             </a:fld>
             <a:endParaRPr lang="en-US"/>
           </a:p>
@@ -1819,7 +1819,7 @@
           <a:p>
             <a:fld id="{31F8AD08-5319-9B49-8237-A1F2CE8B613E}" type="datetimeFigureOut">
               <a:rPr lang="en-US" smtClean="0"/>
-              <a:t>9/1/20</a:t>
+              <a:t>22-Oct-21</a:t>
             </a:fld>
             <a:endParaRPr lang="en-US"/>
           </a:p>
@@ -2096,7 +2096,7 @@
           <a:p>
             <a:fld id="{31F8AD08-5319-9B49-8237-A1F2CE8B613E}" type="datetimeFigureOut">
               <a:rPr lang="en-US" smtClean="0"/>
-              <a:t>9/1/20</a:t>
+              <a:t>22-Oct-21</a:t>
             </a:fld>
             <a:endParaRPr lang="en-US"/>
           </a:p>
@@ -2353,7 +2353,7 @@
           <a:p>
             <a:fld id="{31F8AD08-5319-9B49-8237-A1F2CE8B613E}" type="datetimeFigureOut">
               <a:rPr lang="en-US" smtClean="0"/>
-              <a:t>9/1/20</a:t>
+              <a:t>22-Oct-21</a:t>
             </a:fld>
             <a:endParaRPr lang="en-US"/>
           </a:p>
@@ -2566,7 +2566,7 @@
           <a:p>
             <a:fld id="{31F8AD08-5319-9B49-8237-A1F2CE8B613E}" type="datetimeFigureOut">
               <a:rPr lang="en-US" smtClean="0"/>
-              <a:t>9/1/20</a:t>
+              <a:t>22-Oct-21</a:t>
             </a:fld>
             <a:endParaRPr lang="en-US"/>
           </a:p>
@@ -3051,10 +3051,10 @@
         </p:nvGrpSpPr>
         <p:grpSpPr>
           <a:xfrm>
-            <a:off x="1370604" y="3860908"/>
-            <a:ext cx="27468047" cy="3155067"/>
-            <a:chOff x="341022" y="738717"/>
-            <a:chExt cx="6861154" cy="788094"/>
+            <a:off x="1370604" y="3038755"/>
+            <a:ext cx="27493208" cy="3977220"/>
+            <a:chOff x="341022" y="533354"/>
+            <a:chExt cx="6867439" cy="993457"/>
           </a:xfrm>
         </p:grpSpPr>
         <p:sp>
@@ -3071,8 +3071,8 @@
           </p:nvSpPr>
           <p:spPr>
             <a:xfrm>
-              <a:off x="344176" y="738717"/>
-              <a:ext cx="6858000" cy="276763"/>
+              <a:off x="350461" y="533354"/>
+              <a:ext cx="6858000" cy="530462"/>
             </a:xfrm>
             <a:prstGeom prst="rect">
               <a:avLst/>
@@ -3092,7 +3092,7 @@
                   <a:ea typeface="Arial" charset="0"/>
                   <a:cs typeface="Arial" charset="0"/>
                 </a:rPr>
-                <a:t>The Relationship Between Gender and School Goals</a:t>
+                <a:t>Influence of familiarity effect on Cognitive Processing Math Task (CPMT) performance in placebo-dosed subjects from a Fish Oil study</a:t>
               </a:r>
             </a:p>
           </p:txBody>
@@ -3132,7 +3132,7 @@
                   <a:ea typeface="Arial" charset="0"/>
                   <a:cs typeface="Arial" charset="0"/>
                 </a:rPr>
-                <a:t>Student A. Lastname</a:t>
+                <a:t>Student M. Trajdos</a:t>
               </a:r>
               <a:r>
                 <a:rPr lang="en-GB" sz="4000" baseline="30000" dirty="0">
@@ -3213,10 +3213,10 @@
         </p:nvGrpSpPr>
         <p:grpSpPr>
           <a:xfrm>
-            <a:off x="560516" y="8566605"/>
-            <a:ext cx="14003385" cy="9026158"/>
+            <a:off x="627110" y="7302397"/>
+            <a:ext cx="15603490" cy="9115508"/>
             <a:chOff x="146579" y="2093481"/>
-            <a:chExt cx="3604521" cy="2254615"/>
+            <a:chExt cx="3604521" cy="1815422"/>
           </a:xfrm>
         </p:grpSpPr>
         <p:sp>
@@ -3234,7 +3234,7 @@
           <p:spPr>
             <a:xfrm>
               <a:off x="146579" y="2093481"/>
-              <a:ext cx="3604521" cy="184669"/>
+              <a:ext cx="3604521" cy="165499"/>
             </a:xfrm>
             <a:prstGeom prst="rect">
               <a:avLst/>
@@ -3254,7 +3254,7 @@
             <a:p>
               <a:pPr algn="ctr"/>
               <a:r>
-                <a:rPr lang="en-US" sz="4204" b="1" dirty="0">
+                <a:rPr lang="en-US" sz="4800" b="1" dirty="0">
                   <a:solidFill>
                     <a:schemeClr val="bg1"/>
                   </a:solidFill>
@@ -3264,7 +3264,7 @@
                 </a:rPr>
                 <a:t>Background</a:t>
               </a:r>
-              <a:endParaRPr lang="en-US" sz="4204" dirty="0">
+              <a:endParaRPr lang="en-US" sz="4800" dirty="0">
                 <a:solidFill>
                   <a:schemeClr val="bg1"/>
                 </a:solidFill>
@@ -3290,7 +3290,7 @@
           <p:spPr>
             <a:xfrm>
               <a:off x="202859" y="2367572"/>
-              <a:ext cx="3485680" cy="1980524"/>
+              <a:ext cx="3485680" cy="1541331"/>
             </a:xfrm>
             <a:prstGeom prst="rect">
               <a:avLst/>
@@ -3306,16 +3306,16 @@
                 <a:spcAft>
                   <a:spcPts val="2402"/>
                 </a:spcAft>
-                <a:buFont typeface="Wingdings" pitchFamily="2" charset="2"/>
-                <a:buChar char="v"/>
+                <a:buFont typeface="Wingdings" panose="05000000000000000000" pitchFamily="2" charset="2"/>
+                <a:buChar char="Ø"/>
               </a:pPr>
               <a:r>
-                <a:rPr lang="en-US" sz="3603" dirty="0">
+                <a:rPr lang="en-US" sz="2800" dirty="0">
                   <a:latin typeface="Arial" charset="0"/>
                   <a:ea typeface="Arial" charset="0"/>
                   <a:cs typeface="Arial" charset="0"/>
                 </a:rPr>
-                <a:t>It is not yet established whether boys and girls pursue different goals at school </a:t>
+                <a:t>Manufacturers of vitamins and supplements claim that fish oil improves brain functioning </a:t>
               </a:r>
             </a:p>
             <a:p>
@@ -3323,16 +3323,16 @@
                 <a:spcAft>
                   <a:spcPts val="2402"/>
                 </a:spcAft>
-                <a:buFont typeface="Wingdings" pitchFamily="2" charset="2"/>
-                <a:buChar char="v"/>
+                <a:buFont typeface="Wingdings" panose="05000000000000000000" pitchFamily="2" charset="2"/>
+                <a:buChar char="Ø"/>
               </a:pPr>
               <a:r>
-                <a:rPr lang="en-US" sz="3603" dirty="0">
+                <a:rPr lang="en-US" sz="2800" dirty="0">
                   <a:latin typeface="Arial" charset="0"/>
                   <a:ea typeface="Arial" charset="0"/>
                   <a:cs typeface="Arial" charset="0"/>
                 </a:rPr>
-                <a:t>Socialized gender norms may influence these motivations, leading to differences in educational outcomes</a:t>
+                <a:t>To separate the effect of fish oil administration, we examined the effect of Cognitive Processing Math Task (CPMT) familiarity on performance in CPMT in terms of score and completion time</a:t>
               </a:r>
             </a:p>
             <a:p>
@@ -3340,16 +3340,24 @@
                 <a:spcAft>
                   <a:spcPts val="2402"/>
                 </a:spcAft>
-                <a:buFont typeface="Wingdings" pitchFamily="2" charset="2"/>
-                <a:buChar char="v"/>
+                <a:buFont typeface="Wingdings" panose="05000000000000000000" pitchFamily="2" charset="2"/>
+                <a:buChar char="Ø"/>
               </a:pPr>
               <a:r>
-                <a:rPr lang="en-US" sz="3603" dirty="0">
+                <a:rPr lang="en-US" sz="2800" dirty="0">
                   <a:latin typeface="Arial" charset="0"/>
                   <a:ea typeface="Arial" charset="0"/>
                   <a:cs typeface="Arial" charset="0"/>
                 </a:rPr>
-                <a:t>Research question: do girls and boys in primary school differ in their preferred school goals (grades, popularity, or sports)?</a:t>
+                <a:t>Research question: </a:t>
+              </a:r>
+              <a:r>
+                <a:rPr lang="en-US" sz="2800" b="1" dirty="0">
+                  <a:latin typeface="Arial" charset="0"/>
+                  <a:ea typeface="Arial" charset="0"/>
+                  <a:cs typeface="Arial" charset="0"/>
+                </a:rPr>
+                <a:t>Do placebo subjects improve in CPMT scores and times due to developed familiarity with the task, regardless of their ICV and IQ?</a:t>
               </a:r>
             </a:p>
             <a:p>
@@ -3357,11 +3365,11 @@
                 <a:spcAft>
                   <a:spcPts val="2402"/>
                 </a:spcAft>
-                <a:buFont typeface="Wingdings" pitchFamily="2" charset="2"/>
-                <a:buChar char="v"/>
+                <a:buFont typeface="Wingdings" panose="05000000000000000000" pitchFamily="2" charset="2"/>
+                <a:buChar char="Ø"/>
               </a:pPr>
               <a:r>
-                <a:rPr lang="en-US" sz="3603" dirty="0">
+                <a:rPr lang="en-US" sz="2800" dirty="0">
                   <a:latin typeface="Arial" charset="0"/>
                   <a:ea typeface="Arial" charset="0"/>
                   <a:cs typeface="Arial" charset="0"/>
@@ -3370,38 +3378,133 @@
               </a:r>
             </a:p>
             <a:p>
-              <a:pPr marL="1666875" lvl="1" indent="-595313" algn="just">
+              <a:pPr algn="just">
                 <a:spcAft>
                   <a:spcPts val="2402"/>
                 </a:spcAft>
-                <a:buFont typeface="Wingdings" pitchFamily="2" charset="2"/>
-                <a:buChar char="v"/>
               </a:pPr>
               <a:r>
-                <a:rPr lang="en-US" sz="3603" dirty="0">
+                <a:rPr lang="en-US" sz="2600" dirty="0">
+                  <a:solidFill>
+                    <a:schemeClr val="accent1">
+                      <a:lumMod val="50000"/>
+                    </a:schemeClr>
+                  </a:solidFill>
                   <a:latin typeface="Arial" charset="0"/>
                   <a:ea typeface="Arial" charset="0"/>
                   <a:cs typeface="Arial" charset="0"/>
                 </a:rPr>
-                <a:t>H0: The frequency of endorsement of preferred school goals does not differ by gender</a:t>
+                <a:t>Ho: Lower or upper ICV or IQ does not influence score and time performance of placebo subjects.</a:t>
               </a:r>
-            </a:p>
-            <a:p>
-              <a:pPr marL="1666875" lvl="1" indent="-595313" algn="just">
-                <a:spcAft>
-                  <a:spcPts val="2402"/>
-                </a:spcAft>
-                <a:buFont typeface="Wingdings" pitchFamily="2" charset="2"/>
-                <a:buChar char="v"/>
-              </a:pPr>
-              <a:r>
-                <a:rPr lang="en-US" sz="3603" dirty="0">
+              <a:br>
+                <a:rPr lang="en-US" sz="2600" dirty="0">
+                  <a:solidFill>
+                    <a:schemeClr val="accent1">
+                      <a:lumMod val="50000"/>
+                    </a:schemeClr>
+                  </a:solidFill>
                   <a:latin typeface="Arial" charset="0"/>
                   <a:ea typeface="Arial" charset="0"/>
                   <a:cs typeface="Arial" charset="0"/>
                 </a:rPr>
-                <a:t>H1: The frequency of endorsement of preferred school goals differs between girls and boys</a:t>
+              </a:br>
+              <a:r>
+                <a:rPr lang="en-US" sz="2600" dirty="0">
+                  <a:solidFill>
+                    <a:schemeClr val="accent1">
+                      <a:lumMod val="50000"/>
+                    </a:schemeClr>
+                  </a:solidFill>
+                  <a:latin typeface="Arial" charset="0"/>
+                  <a:ea typeface="Arial" charset="0"/>
+                  <a:cs typeface="Arial" charset="0"/>
+                </a:rPr>
+                <a:t>Ha: Lower or upper ICV or IQ do influence score and time performance of placebo subjects.</a:t>
               </a:r>
+              <a:br>
+                <a:rPr lang="en-US" sz="2600" dirty="0">
+                  <a:solidFill>
+                    <a:schemeClr val="accent1">
+                      <a:lumMod val="50000"/>
+                    </a:schemeClr>
+                  </a:solidFill>
+                  <a:latin typeface="Arial" charset="0"/>
+                  <a:ea typeface="Arial" charset="0"/>
+                  <a:cs typeface="Arial" charset="0"/>
+                </a:rPr>
+              </a:br>
+              <a:br>
+                <a:rPr lang="en-US" sz="2600" dirty="0">
+                  <a:solidFill>
+                    <a:schemeClr val="accent1">
+                      <a:lumMod val="50000"/>
+                    </a:schemeClr>
+                  </a:solidFill>
+                  <a:latin typeface="Arial" charset="0"/>
+                  <a:ea typeface="Arial" charset="0"/>
+                  <a:cs typeface="Arial" charset="0"/>
+                </a:rPr>
+              </a:br>
+              <a:r>
+                <a:rPr lang="en-US" sz="2600" dirty="0">
+                  <a:solidFill>
+                    <a:schemeClr val="tx2">
+                      <a:lumMod val="50000"/>
+                    </a:schemeClr>
+                  </a:solidFill>
+                  <a:latin typeface="Arial" charset="0"/>
+                  <a:ea typeface="Arial" charset="0"/>
+                  <a:cs typeface="Arial" charset="0"/>
+                </a:rPr>
+                <a:t>Ho: There is no increase of CPMT scores and no decrease of CPMT times in placebo subjects, suggesting increased performance reliant on fish oil administration.</a:t>
+              </a:r>
+              <a:br>
+                <a:rPr lang="en-US" sz="2600" dirty="0">
+                  <a:solidFill>
+                    <a:schemeClr val="tx2">
+                      <a:lumMod val="50000"/>
+                    </a:schemeClr>
+                  </a:solidFill>
+                  <a:latin typeface="Arial" charset="0"/>
+                  <a:ea typeface="Arial" charset="0"/>
+                  <a:cs typeface="Arial" charset="0"/>
+                </a:rPr>
+              </a:br>
+              <a:r>
+                <a:rPr lang="en-US" sz="2600" dirty="0">
+                  <a:solidFill>
+                    <a:schemeClr val="tx2">
+                      <a:lumMod val="50000"/>
+                    </a:schemeClr>
+                  </a:solidFill>
+                  <a:latin typeface="Arial" charset="0"/>
+                  <a:ea typeface="Arial" charset="0"/>
+                  <a:cs typeface="Arial" charset="0"/>
+                </a:rPr>
+                <a:t>Ha : There is an increase of CPMT scores and a decrease of CPMT times in placebo subjects, suggesting increased performance due to developing a familiarity with the task.</a:t>
+              </a:r>
+              <a:br>
+                <a:rPr lang="en-US" sz="2600" dirty="0">
+                  <a:solidFill>
+                    <a:schemeClr val="tx2">
+                      <a:lumMod val="50000"/>
+                    </a:schemeClr>
+                  </a:solidFill>
+                  <a:latin typeface="Arial" charset="0"/>
+                  <a:ea typeface="Arial" charset="0"/>
+                  <a:cs typeface="Arial" charset="0"/>
+                </a:rPr>
+              </a:br>
+              <a:endParaRPr lang="en-US" sz="2600" dirty="0">
+                <a:solidFill>
+                  <a:schemeClr val="tx2">
+                    <a:lumMod val="50000"/>
+                  </a:schemeClr>
+                </a:solidFill>
+                <a:latin typeface="Arial" charset="0"/>
+                <a:ea typeface="Arial" charset="0"/>
+                <a:cs typeface="Arial" charset="0"/>
+              </a:endParaRPr>
             </a:p>
           </p:txBody>
         </p:sp>
@@ -3420,226 +3523,501 @@
         </p:nvGrpSpPr>
         <p:grpSpPr>
           <a:xfrm>
-            <a:off x="15632741" y="8550417"/>
-            <a:ext cx="14015363" cy="9532898"/>
+            <a:off x="16443850" y="7313375"/>
+            <a:ext cx="13417504" cy="10588097"/>
             <a:chOff x="143496" y="5128917"/>
-            <a:chExt cx="3607604" cy="2381192"/>
+            <a:chExt cx="3607604" cy="1843090"/>
           </a:xfrm>
         </p:grpSpPr>
-        <p:sp>
-          <p:nvSpPr>
-            <p:cNvPr id="10" name="Rectangle 9">
-              <a:extLst>
-                <a:ext uri="{FF2B5EF4-FFF2-40B4-BE49-F238E27FC236}">
-                  <a16:creationId xmlns:a16="http://schemas.microsoft.com/office/drawing/2014/main" id="{84686A7F-7F2A-4440-9804-171F5EECF0DD}"/>
-                </a:ext>
-              </a:extLst>
-            </p:cNvPr>
-            <p:cNvSpPr/>
-            <p:nvPr/>
-          </p:nvSpPr>
-          <p:spPr>
-            <a:xfrm>
-              <a:off x="204177" y="5406355"/>
-              <a:ext cx="3485681" cy="2103754"/>
-            </a:xfrm>
-            <a:prstGeom prst="rect">
-              <a:avLst/>
-            </a:prstGeom>
-          </p:spPr>
-          <p:txBody>
-            <a:bodyPr wrap="square" lIns="144123" tIns="144123" rIns="144123" bIns="144123">
-              <a:spAutoFit/>
-            </a:bodyPr>
-            <a:lstStyle/>
-            <a:p>
-              <a:pPr algn="just">
-                <a:spcAft>
-                  <a:spcPts val="801"/>
-                </a:spcAft>
-              </a:pPr>
-              <a:r>
-                <a:rPr lang="en-US" sz="3603" dirty="0">
-                  <a:solidFill>
-                    <a:srgbClr val="000000"/>
-                  </a:solidFill>
-                  <a:latin typeface="Arial" charset="0"/>
-                  <a:ea typeface="Times New Roman" charset="0"/>
-                  <a:cs typeface="MyriadMM-Regular" charset="0"/>
-                </a:rPr>
-                <a:t>Sample:</a:t>
-              </a:r>
-            </a:p>
-            <a:p>
-              <a:pPr marL="686383" indent="-686383" algn="just">
-                <a:spcAft>
-                  <a:spcPts val="801"/>
-                </a:spcAft>
-                <a:buFont typeface="Wingdings" pitchFamily="2" charset="2"/>
-                <a:buChar char="v"/>
-              </a:pPr>
-              <a:r>
-                <a:rPr lang="en-US" sz="3603" dirty="0">
-                  <a:solidFill>
-                    <a:srgbClr val="000000"/>
-                  </a:solidFill>
-                  <a:latin typeface="Arial" charset="0"/>
-                  <a:ea typeface="Times New Roman" charset="0"/>
-                  <a:cs typeface="MyriadMM-Regular" charset="0"/>
-                </a:rPr>
-                <a:t>Random selection of students in grades 4, 5, and 6 from local primary schools (N = 478)</a:t>
-              </a:r>
-            </a:p>
-            <a:p>
-              <a:pPr marL="686383" indent="-686383" algn="just">
-                <a:spcAft>
-                  <a:spcPts val="801"/>
-                </a:spcAft>
-                <a:buFont typeface="Wingdings" pitchFamily="2" charset="2"/>
-                <a:buChar char="v"/>
-              </a:pPr>
-              <a:r>
-                <a:rPr lang="en-US" sz="3603" dirty="0">
-                  <a:solidFill>
-                    <a:srgbClr val="000000"/>
-                  </a:solidFill>
-                  <a:latin typeface="Arial" charset="0"/>
-                  <a:ea typeface="Times New Roman" charset="0"/>
-                  <a:cs typeface="MyriadMM-Regular" charset="0"/>
-                </a:rPr>
-                <a:t>227 boys, 251 girls</a:t>
-              </a:r>
-            </a:p>
-            <a:p>
-              <a:pPr marL="686383" indent="-686383" algn="just">
-                <a:spcAft>
-                  <a:spcPts val="801"/>
-                </a:spcAft>
-                <a:buFont typeface="Wingdings" pitchFamily="2" charset="2"/>
-                <a:buChar char="v"/>
-              </a:pPr>
-              <a:endParaRPr lang="en-US" sz="3603" dirty="0">
-                <a:solidFill>
-                  <a:srgbClr val="000000"/>
-                </a:solidFill>
-                <a:latin typeface="Arial" charset="0"/>
-                <a:ea typeface="Times New Roman" charset="0"/>
-                <a:cs typeface="MyriadMM-Regular" charset="0"/>
-              </a:endParaRPr>
-            </a:p>
-            <a:p>
-              <a:pPr algn="just">
-                <a:spcAft>
-                  <a:spcPts val="801"/>
-                </a:spcAft>
-              </a:pPr>
-              <a:r>
-                <a:rPr lang="en-US" sz="3603" dirty="0">
-                  <a:solidFill>
-                    <a:srgbClr val="000000"/>
-                  </a:solidFill>
-                  <a:latin typeface="Arial" charset="0"/>
-                  <a:ea typeface="Times New Roman" charset="0"/>
-                  <a:cs typeface="MyriadMM-Regular" charset="0"/>
-                </a:rPr>
-                <a:t>Measures:</a:t>
-              </a:r>
-            </a:p>
-            <a:p>
-              <a:pPr marL="686383" indent="-686383" algn="just">
-                <a:spcAft>
-                  <a:spcPts val="801"/>
-                </a:spcAft>
-                <a:buFont typeface="Wingdings" pitchFamily="2" charset="2"/>
-                <a:buChar char="v"/>
-              </a:pPr>
-              <a:r>
-                <a:rPr lang="en-US" sz="3603" dirty="0">
-                  <a:solidFill>
-                    <a:srgbClr val="000000"/>
-                  </a:solidFill>
-                  <a:latin typeface="Arial" charset="0"/>
-                  <a:ea typeface="Times New Roman" charset="0"/>
-                  <a:cs typeface="MyriadMM-Regular" charset="0"/>
-                </a:rPr>
-                <a:t>Self-report survey of preferred school goal (making good grades, being popular, or being good at sports)</a:t>
-              </a:r>
-            </a:p>
-            <a:p>
-              <a:pPr algn="just">
-                <a:spcAft>
-                  <a:spcPts val="801"/>
-                </a:spcAft>
-              </a:pPr>
-              <a:endParaRPr lang="en-US" sz="3603" dirty="0">
-                <a:solidFill>
-                  <a:srgbClr val="000000"/>
-                </a:solidFill>
-                <a:latin typeface="Arial" charset="0"/>
-                <a:ea typeface="Times New Roman" charset="0"/>
-                <a:cs typeface="MyriadMM-Regular" charset="0"/>
-              </a:endParaRPr>
-            </a:p>
-            <a:p>
-              <a:pPr algn="just">
-                <a:spcAft>
-                  <a:spcPts val="801"/>
-                </a:spcAft>
-              </a:pPr>
-              <a:r>
-                <a:rPr lang="en-US" sz="3603" dirty="0">
-                  <a:solidFill>
-                    <a:srgbClr val="000000"/>
-                  </a:solidFill>
-                  <a:latin typeface="Arial" charset="0"/>
-                  <a:ea typeface="Times New Roman" charset="0"/>
-                  <a:cs typeface="MyriadMM-Regular" charset="0"/>
-                </a:rPr>
-                <a:t>Data Analysis:</a:t>
-              </a:r>
-            </a:p>
-            <a:p>
-              <a:pPr marL="686383" indent="-686383" algn="just">
-                <a:spcAft>
-                  <a:spcPts val="801"/>
-                </a:spcAft>
-                <a:buFont typeface="Wingdings" pitchFamily="2" charset="2"/>
-                <a:buChar char="v"/>
-              </a:pPr>
-              <a:r>
-                <a:rPr lang="en-US" sz="3603" dirty="0">
-                  <a:solidFill>
-                    <a:srgbClr val="000000"/>
-                  </a:solidFill>
-                  <a:latin typeface="Arial" charset="0"/>
-                  <a:ea typeface="Times New Roman" charset="0"/>
-                  <a:cs typeface="MyriadMM-Regular" charset="0"/>
-                </a:rPr>
-                <a:t>Frequency cross-tabulation of gender by goal</a:t>
-              </a:r>
-            </a:p>
-            <a:p>
-              <a:pPr marL="686383" indent="-686383" algn="just">
-                <a:spcAft>
-                  <a:spcPts val="801"/>
-                </a:spcAft>
-                <a:buFont typeface="Wingdings" pitchFamily="2" charset="2"/>
-                <a:buChar char="v"/>
-              </a:pPr>
-              <a:r>
-                <a:rPr lang="en-US" sz="3603" dirty="0">
-                  <a:solidFill>
-                    <a:srgbClr val="000000"/>
-                  </a:solidFill>
-                  <a:latin typeface="Arial" charset="0"/>
-                  <a:ea typeface="Times New Roman" charset="0"/>
-                  <a:cs typeface="MyriadMM-Regular" charset="0"/>
-                </a:rPr>
-                <a:t>Chi-square test of association between these two categorical variables using R</a:t>
-              </a:r>
-            </a:p>
-          </p:txBody>
-        </p:sp>
+        <mc:AlternateContent xmlns:mc="http://schemas.openxmlformats.org/markup-compatibility/2006" xmlns:a14="http://schemas.microsoft.com/office/drawing/2010/main">
+          <mc:Choice Requires="a14">
+            <p:sp>
+              <p:nvSpPr>
+                <p:cNvPr id="10" name="Rectangle 9">
+                  <a:extLst>
+                    <a:ext uri="{FF2B5EF4-FFF2-40B4-BE49-F238E27FC236}">
+                      <a16:creationId xmlns:a16="http://schemas.microsoft.com/office/drawing/2014/main" id="{84686A7F-7F2A-4440-9804-171F5EECF0DD}"/>
+                    </a:ext>
+                  </a:extLst>
+                </p:cNvPr>
+                <p:cNvSpPr/>
+                <p:nvPr/>
+              </p:nvSpPr>
+              <p:spPr>
+                <a:xfrm>
+                  <a:off x="208082" y="5174721"/>
+                  <a:ext cx="3485681" cy="1797286"/>
+                </a:xfrm>
+                <a:prstGeom prst="rect">
+                  <a:avLst/>
+                </a:prstGeom>
+              </p:spPr>
+              <p:txBody>
+                <a:bodyPr wrap="square" lIns="144123" tIns="144123" rIns="144123" bIns="144123">
+                  <a:spAutoFit/>
+                </a:bodyPr>
+                <a:lstStyle/>
+                <a:p>
+                  <a:pPr algn="just">
+                    <a:spcAft>
+                      <a:spcPts val="801"/>
+                    </a:spcAft>
+                  </a:pPr>
+                  <a:endParaRPr lang="en-US" sz="3200" dirty="0">
+                    <a:solidFill>
+                      <a:srgbClr val="000000"/>
+                    </a:solidFill>
+                    <a:latin typeface="Arial" charset="0"/>
+                    <a:ea typeface="Times New Roman" charset="0"/>
+                    <a:cs typeface="MyriadMM-Regular" charset="0"/>
+                  </a:endParaRPr>
+                </a:p>
+                <a:p>
+                  <a:pPr marL="686383" indent="-686383" algn="just">
+                    <a:spcAft>
+                      <a:spcPts val="801"/>
+                    </a:spcAft>
+                    <a:buFont typeface="Wingdings" panose="05000000000000000000" pitchFamily="2" charset="2"/>
+                    <a:buChar char="Ø"/>
+                  </a:pPr>
+                  <a:r>
+                    <a:rPr lang="en-US" sz="3100" dirty="0">
+                      <a:solidFill>
+                        <a:srgbClr val="000000"/>
+                      </a:solidFill>
+                      <a:latin typeface="Arial" charset="0"/>
+                      <a:ea typeface="Times New Roman" charset="0"/>
+                      <a:cs typeface="MyriadMM-Regular" charset="0"/>
+                    </a:rPr>
+                    <a:t>Random selection of subjects assigned to placebo or dosage groups N = 300, of which a data subset of N = 75 placebo subjects has been analyzed</a:t>
+                  </a:r>
+                </a:p>
+                <a:p>
+                  <a:pPr marL="686383" indent="-686383" algn="just">
+                    <a:spcAft>
+                      <a:spcPts val="801"/>
+                    </a:spcAft>
+                    <a:buFont typeface="Wingdings" panose="05000000000000000000" pitchFamily="2" charset="2"/>
+                    <a:buChar char="Ø"/>
+                  </a:pPr>
+                  <a:r>
+                    <a:rPr lang="en-US" sz="3100" dirty="0">
+                      <a:solidFill>
+                        <a:srgbClr val="000000"/>
+                      </a:solidFill>
+                      <a:latin typeface="Arial" charset="0"/>
+                      <a:ea typeface="Times New Roman" charset="0"/>
+                      <a:cs typeface="MyriadMM-Regular" charset="0"/>
+                    </a:rPr>
+                    <a:t>Measurements of intracranial volume (ICV), IQ test, CPMT scores and times before fish oil administration and then CPMT again at the end of each of the three weeks of the study</a:t>
+                  </a:r>
+                </a:p>
+                <a:p>
+                  <a:pPr marL="686383" indent="-686383" algn="just">
+                    <a:spcAft>
+                      <a:spcPts val="801"/>
+                    </a:spcAft>
+                    <a:buFont typeface="Wingdings" panose="05000000000000000000" pitchFamily="2" charset="2"/>
+                    <a:buChar char="Ø"/>
+                  </a:pPr>
+                  <a:r>
+                    <a:rPr lang="en-US" sz="3100" dirty="0">
+                      <a:solidFill>
+                        <a:srgbClr val="000000"/>
+                      </a:solidFill>
+                      <a:latin typeface="Arial" charset="0"/>
+                      <a:ea typeface="Times New Roman" charset="0"/>
+                      <a:cs typeface="MyriadMM-Regular" charset="0"/>
+                    </a:rPr>
+                    <a:t>Long format data analyzed with independent t-tests, repeated measures ANOVA to search for differences in means of scores and times of CPMT between upper-lower ICV and upper-lower IQ quantiles, including relative score (RSI) and time (RTI) improvements:</a:t>
+                  </a:r>
+                </a:p>
+                <a:p>
+                  <a:pPr marL="686383" indent="-686383" algn="just">
+                    <a:spcAft>
+                      <a:spcPts val="801"/>
+                    </a:spcAft>
+                    <a:buFont typeface="Wingdings" panose="05000000000000000000" pitchFamily="2" charset="2"/>
+                    <a:buChar char="Ø"/>
+                  </a:pPr>
+                  <a:endParaRPr lang="en-US" sz="3200" dirty="0">
+                    <a:solidFill>
+                      <a:srgbClr val="000000"/>
+                    </a:solidFill>
+                    <a:latin typeface="Arial" charset="0"/>
+                    <a:ea typeface="Times New Roman" charset="0"/>
+                    <a:cs typeface="MyriadMM-Regular" charset="0"/>
+                  </a:endParaRPr>
+                </a:p>
+                <a:p>
+                  <a:pPr algn="just">
+                    <a:spcAft>
+                      <a:spcPts val="801"/>
+                    </a:spcAft>
+                  </a:pPr>
+                  <a14:m>
+                    <m:oMathPara xmlns:m="http://schemas.openxmlformats.org/officeDocument/2006/math">
+                      <m:oMathParaPr>
+                        <m:jc m:val="center"/>
+                      </m:oMathParaPr>
+                      <m:oMath xmlns:m="http://schemas.openxmlformats.org/officeDocument/2006/math">
+                        <m:r>
+                          <a:rPr lang="en-US" sz="3200" b="0" i="1" smtClean="0">
+                            <a:solidFill>
+                              <a:srgbClr val="000000"/>
+                            </a:solidFill>
+                            <a:latin typeface="Cambria Math" panose="02040503050406030204" pitchFamily="18" charset="0"/>
+                          </a:rPr>
+                          <m:t>%</m:t>
+                        </m:r>
+                        <m:r>
+                          <a:rPr lang="en-US" sz="3200" b="0" i="1" smtClean="0">
+                            <a:solidFill>
+                              <a:schemeClr val="accent5">
+                                <a:lumMod val="75000"/>
+                              </a:schemeClr>
+                            </a:solidFill>
+                            <a:latin typeface="Cambria Math" panose="02040503050406030204" pitchFamily="18" charset="0"/>
+                          </a:rPr>
+                          <m:t>𝑅𝑆𝐼</m:t>
+                        </m:r>
+                        <m:r>
+                          <a:rPr lang="en-US" sz="3200" b="0" i="1" smtClean="0">
+                            <a:solidFill>
+                              <a:srgbClr val="000000"/>
+                            </a:solidFill>
+                            <a:latin typeface="Cambria Math" panose="02040503050406030204" pitchFamily="18" charset="0"/>
+                          </a:rPr>
+                          <m:t> \</m:t>
+                        </m:r>
+                        <m:r>
+                          <m:rPr>
+                            <m:lit/>
+                          </m:rPr>
+                          <a:rPr lang="en-US" sz="3200" b="0" i="1" smtClean="0">
+                            <a:solidFill>
+                              <a:srgbClr val="000000"/>
+                            </a:solidFill>
+                            <a:latin typeface="Cambria Math" panose="02040503050406030204" pitchFamily="18" charset="0"/>
+                          </a:rPr>
+                          <m:t> </m:t>
+                        </m:r>
+                        <m:r>
+                          <a:rPr lang="en-US" sz="3200" b="0" i="1" smtClean="0">
+                            <a:solidFill>
+                              <a:schemeClr val="accent6">
+                                <a:lumMod val="75000"/>
+                              </a:schemeClr>
+                            </a:solidFill>
+                            <a:latin typeface="Cambria Math" panose="02040503050406030204" pitchFamily="18" charset="0"/>
+                          </a:rPr>
+                          <m:t>𝑅𝑇𝐼</m:t>
+                        </m:r>
+                        <m:r>
+                          <a:rPr lang="en-US" sz="3200" b="0" i="1" smtClean="0">
+                            <a:solidFill>
+                              <a:srgbClr val="000000"/>
+                            </a:solidFill>
+                            <a:latin typeface="Cambria Math" panose="02040503050406030204" pitchFamily="18" charset="0"/>
+                          </a:rPr>
+                          <m:t>=</m:t>
+                        </m:r>
+                        <m:f>
+                          <m:fPr>
+                            <m:ctrlPr>
+                              <a:rPr lang="en-US" sz="3200" b="0" i="1" smtClean="0">
+                                <a:solidFill>
+                                  <a:srgbClr val="000000"/>
+                                </a:solidFill>
+                                <a:latin typeface="Cambria Math" panose="02040503050406030204" pitchFamily="18" charset="0"/>
+                              </a:rPr>
+                            </m:ctrlPr>
+                          </m:fPr>
+                          <m:num>
+                            <m:r>
+                              <a:rPr lang="en-US" sz="3200" b="0" i="1" smtClean="0">
+                                <a:solidFill>
+                                  <a:schemeClr val="accent5">
+                                    <a:lumMod val="75000"/>
+                                  </a:schemeClr>
+                                </a:solidFill>
+                                <a:latin typeface="Cambria Math" panose="02040503050406030204" pitchFamily="18" charset="0"/>
+                              </a:rPr>
+                              <m:t>𝑆𝑐𝑜𝑟𝑒</m:t>
+                            </m:r>
+                            <m:r>
+                              <a:rPr lang="en-US" sz="3200" b="0" i="1" smtClean="0">
+                                <a:solidFill>
+                                  <a:srgbClr val="000000"/>
+                                </a:solidFill>
+                                <a:latin typeface="Cambria Math" panose="02040503050406030204" pitchFamily="18" charset="0"/>
+                              </a:rPr>
+                              <m:t> \ </m:t>
+                            </m:r>
+                            <m:sSub>
+                              <m:sSubPr>
+                                <m:ctrlPr>
+                                  <a:rPr lang="en-US" sz="3200" b="0" i="1" smtClean="0">
+                                    <a:solidFill>
+                                      <a:srgbClr val="000000"/>
+                                    </a:solidFill>
+                                    <a:latin typeface="Cambria Math" panose="02040503050406030204" pitchFamily="18" charset="0"/>
+                                  </a:rPr>
+                                </m:ctrlPr>
+                              </m:sSubPr>
+                              <m:e>
+                                <m:r>
+                                  <a:rPr lang="en-US" sz="3200" b="0" i="1" smtClean="0">
+                                    <a:solidFill>
+                                      <a:schemeClr val="accent6">
+                                        <a:lumMod val="75000"/>
+                                      </a:schemeClr>
+                                    </a:solidFill>
+                                    <a:latin typeface="Cambria Math" panose="02040503050406030204" pitchFamily="18" charset="0"/>
+                                  </a:rPr>
+                                  <m:t>𝑇𝑖𝑚𝑒</m:t>
+                                </m:r>
+                              </m:e>
+                              <m:sub>
+                                <m:r>
+                                  <a:rPr lang="en-US" sz="3200" b="0" i="1" smtClean="0">
+                                    <a:solidFill>
+                                      <a:srgbClr val="000000"/>
+                                    </a:solidFill>
+                                    <a:latin typeface="Cambria Math" panose="02040503050406030204" pitchFamily="18" charset="0"/>
+                                  </a:rPr>
+                                  <m:t>𝑐𝑢𝑟𝑟𝑒𝑛𝑡</m:t>
+                                </m:r>
+                                <m:r>
+                                  <a:rPr lang="en-US" sz="3200" b="0" i="1" smtClean="0">
+                                    <a:solidFill>
+                                      <a:srgbClr val="000000"/>
+                                    </a:solidFill>
+                                    <a:latin typeface="Cambria Math" panose="02040503050406030204" pitchFamily="18" charset="0"/>
+                                  </a:rPr>
+                                  <m:t> </m:t>
+                                </m:r>
+                                <m:r>
+                                  <a:rPr lang="en-US" sz="3200" b="0" i="1" smtClean="0">
+                                    <a:solidFill>
+                                      <a:srgbClr val="000000"/>
+                                    </a:solidFill>
+                                    <a:latin typeface="Cambria Math" panose="02040503050406030204" pitchFamily="18" charset="0"/>
+                                  </a:rPr>
+                                  <m:t>𝑤𝑒𝑒𝑘</m:t>
+                                </m:r>
+                              </m:sub>
+                            </m:sSub>
+                            <m:r>
+                              <a:rPr lang="en-US" sz="3200" b="0" i="1" smtClean="0">
+                                <a:solidFill>
+                                  <a:srgbClr val="000000"/>
+                                </a:solidFill>
+                                <a:latin typeface="Cambria Math" panose="02040503050406030204" pitchFamily="18" charset="0"/>
+                              </a:rPr>
+                              <m:t> ∗100%</m:t>
+                            </m:r>
+                          </m:num>
+                          <m:den>
+                            <m:r>
+                              <a:rPr lang="en-US" sz="3200" i="1" smtClean="0">
+                                <a:solidFill>
+                                  <a:schemeClr val="accent5">
+                                    <a:lumMod val="75000"/>
+                                  </a:schemeClr>
+                                </a:solidFill>
+                                <a:latin typeface="Cambria Math" panose="02040503050406030204" pitchFamily="18" charset="0"/>
+                              </a:rPr>
+                              <m:t>𝑆𝑐𝑜𝑟𝑒</m:t>
+                            </m:r>
+                            <m:r>
+                              <a:rPr lang="en-US" sz="3200" i="1">
+                                <a:solidFill>
+                                  <a:srgbClr val="000000"/>
+                                </a:solidFill>
+                                <a:latin typeface="Cambria Math" panose="02040503050406030204" pitchFamily="18" charset="0"/>
+                              </a:rPr>
+                              <m:t> \ </m:t>
+                            </m:r>
+                            <m:sSub>
+                              <m:sSubPr>
+                                <m:ctrlPr>
+                                  <a:rPr lang="en-US" sz="3200" i="1">
+                                    <a:solidFill>
+                                      <a:srgbClr val="000000"/>
+                                    </a:solidFill>
+                                    <a:latin typeface="Cambria Math" panose="02040503050406030204" pitchFamily="18" charset="0"/>
+                                  </a:rPr>
+                                </m:ctrlPr>
+                              </m:sSubPr>
+                              <m:e>
+                                <m:r>
+                                  <a:rPr lang="en-US" sz="3200" i="1" smtClean="0">
+                                    <a:solidFill>
+                                      <a:schemeClr val="accent6">
+                                        <a:lumMod val="75000"/>
+                                      </a:schemeClr>
+                                    </a:solidFill>
+                                    <a:latin typeface="Cambria Math" panose="02040503050406030204" pitchFamily="18" charset="0"/>
+                                  </a:rPr>
+                                  <m:t>𝑇𝑖𝑚𝑒</m:t>
+                                </m:r>
+                              </m:e>
+                              <m:sub>
+                                <m:r>
+                                  <a:rPr lang="en-US" sz="3200" b="0" i="1" smtClean="0">
+                                    <a:solidFill>
+                                      <a:srgbClr val="000000"/>
+                                    </a:solidFill>
+                                    <a:latin typeface="Cambria Math" panose="02040503050406030204" pitchFamily="18" charset="0"/>
+                                  </a:rPr>
+                                  <m:t>𝑝𝑟𝑒𝑣𝑖𝑜𝑢𝑠</m:t>
+                                </m:r>
+                                <m:r>
+                                  <a:rPr lang="en-US" sz="3200" i="1">
+                                    <a:solidFill>
+                                      <a:srgbClr val="000000"/>
+                                    </a:solidFill>
+                                    <a:latin typeface="Cambria Math" panose="02040503050406030204" pitchFamily="18" charset="0"/>
+                                  </a:rPr>
+                                  <m:t> </m:t>
+                                </m:r>
+                                <m:r>
+                                  <a:rPr lang="en-US" sz="3200" i="1">
+                                    <a:solidFill>
+                                      <a:srgbClr val="000000"/>
+                                    </a:solidFill>
+                                    <a:latin typeface="Cambria Math" panose="02040503050406030204" pitchFamily="18" charset="0"/>
+                                  </a:rPr>
+                                  <m:t>𝑤𝑒𝑒𝑘</m:t>
+                                </m:r>
+                              </m:sub>
+                            </m:sSub>
+                          </m:den>
+                        </m:f>
+                        <m:r>
+                          <a:rPr lang="en-US" sz="3200" b="0" i="0" smtClean="0">
+                            <a:solidFill>
+                              <a:srgbClr val="000000"/>
+                            </a:solidFill>
+                            <a:latin typeface="Cambria Math" panose="02040503050406030204" pitchFamily="18" charset="0"/>
+                          </a:rPr>
+                          <m:t>−100</m:t>
+                        </m:r>
+                      </m:oMath>
+                    </m:oMathPara>
+                  </a14:m>
+                  <a:endParaRPr lang="en-US" sz="3200" dirty="0">
+                    <a:solidFill>
+                      <a:srgbClr val="000000"/>
+                    </a:solidFill>
+                    <a:latin typeface="Arial" charset="0"/>
+                    <a:ea typeface="Times New Roman" charset="0"/>
+                    <a:cs typeface="MyriadMM-Regular" charset="0"/>
+                  </a:endParaRPr>
+                </a:p>
+                <a:p>
+                  <a:pPr marL="686383" indent="-686383" algn="just">
+                    <a:spcAft>
+                      <a:spcPts val="801"/>
+                    </a:spcAft>
+                    <a:buFont typeface="Wingdings" panose="05000000000000000000" pitchFamily="2" charset="2"/>
+                    <a:buChar char="Ø"/>
+                  </a:pPr>
+                  <a:endParaRPr lang="en-US" sz="3200" dirty="0">
+                    <a:solidFill>
+                      <a:srgbClr val="000000"/>
+                    </a:solidFill>
+                    <a:latin typeface="Arial" charset="0"/>
+                    <a:ea typeface="Times New Roman" charset="0"/>
+                    <a:cs typeface="MyriadMM-Regular" charset="0"/>
+                  </a:endParaRPr>
+                </a:p>
+                <a:p>
+                  <a:pPr marL="686383" indent="-686383" algn="just">
+                    <a:spcAft>
+                      <a:spcPts val="801"/>
+                    </a:spcAft>
+                    <a:buFont typeface="Wingdings" panose="05000000000000000000" pitchFamily="2" charset="2"/>
+                    <a:buChar char="Ø"/>
+                  </a:pPr>
+                  <a:r>
+                    <a:rPr lang="en-US" sz="3100" dirty="0">
+                      <a:solidFill>
+                        <a:srgbClr val="000000"/>
+                      </a:solidFill>
+                      <a:latin typeface="Arial" charset="0"/>
+                      <a:ea typeface="Times New Roman" charset="0"/>
+                      <a:cs typeface="MyriadMM-Regular" charset="0"/>
+                    </a:rPr>
+                    <a:t>Multilevel analysis used for quantiles that had significantly different CPMT score or time means</a:t>
+                  </a:r>
+                </a:p>
+                <a:p>
+                  <a:pPr marL="686383" indent="-686383" algn="just">
+                    <a:spcAft>
+                      <a:spcPts val="801"/>
+                    </a:spcAft>
+                    <a:buFont typeface="Wingdings" panose="05000000000000000000" pitchFamily="2" charset="2"/>
+                    <a:buChar char="Ø"/>
+                  </a:pPr>
+                  <a:endParaRPr lang="en-US" sz="3200" dirty="0">
+                    <a:solidFill>
+                      <a:srgbClr val="000000"/>
+                    </a:solidFill>
+                    <a:latin typeface="Arial" charset="0"/>
+                    <a:ea typeface="Times New Roman" charset="0"/>
+                    <a:cs typeface="MyriadMM-Regular" charset="0"/>
+                  </a:endParaRPr>
+                </a:p>
+              </p:txBody>
+            </p:sp>
+          </mc:Choice>
+          <mc:Fallback xmlns="">
+            <p:sp>
+              <p:nvSpPr>
+                <p:cNvPr id="10" name="Rectangle 9">
+                  <a:extLst>
+                    <a:ext uri="{FF2B5EF4-FFF2-40B4-BE49-F238E27FC236}">
+                      <a16:creationId xmlns:a16="http://schemas.microsoft.com/office/drawing/2014/main" id="{84686A7F-7F2A-4440-9804-171F5EECF0DD}"/>
+                    </a:ext>
+                  </a:extLst>
+                </p:cNvPr>
+                <p:cNvSpPr>
+                  <a:spLocks noRot="1" noChangeAspect="1" noMove="1" noResize="1" noEditPoints="1" noAdjustHandles="1" noChangeArrowheads="1" noChangeShapeType="1" noTextEdit="1"/>
+                </p:cNvSpPr>
+                <p:nvPr/>
+              </p:nvSpPr>
+              <p:spPr>
+                <a:xfrm>
+                  <a:off x="208082" y="5174721"/>
+                  <a:ext cx="3485681" cy="1797286"/>
+                </a:xfrm>
+                <a:prstGeom prst="rect">
+                  <a:avLst/>
+                </a:prstGeom>
+                <a:blipFill>
+                  <a:blip r:embed="rId2"/>
+                  <a:stretch>
+                    <a:fillRect l="-611" r="-705"/>
+                  </a:stretch>
+                </a:blipFill>
+              </p:spPr>
+              <p:txBody>
+                <a:bodyPr/>
+                <a:lstStyle/>
+                <a:p>
+                  <a:r>
+                    <a:rPr lang="en-US">
+                      <a:noFill/>
+                    </a:rPr>
+                    <a:t> </a:t>
+                  </a:r>
+                </a:p>
+              </p:txBody>
+            </p:sp>
+          </mc:Fallback>
+        </mc:AlternateContent>
         <p:sp>
           <p:nvSpPr>
             <p:cNvPr id="11" name="TextBox 10">
@@ -3655,7 +4033,7 @@
           <p:spPr>
             <a:xfrm>
               <a:off x="143496" y="5128917"/>
-              <a:ext cx="3607604" cy="184669"/>
+              <a:ext cx="3607604" cy="144653"/>
             </a:xfrm>
             <a:prstGeom prst="rect">
               <a:avLst/>
@@ -3675,7 +4053,7 @@
             <a:p>
               <a:pPr algn="ctr"/>
               <a:r>
-                <a:rPr lang="en-US" sz="4204" b="1" dirty="0">
+                <a:rPr lang="en-US" sz="4800" b="1" dirty="0">
                   <a:solidFill>
                     <a:schemeClr val="bg1"/>
                   </a:solidFill>
@@ -3711,8 +4089,8 @@
         </p:nvSpPr>
         <p:spPr>
           <a:xfrm>
-            <a:off x="548532" y="19558919"/>
-            <a:ext cx="29099563" cy="739305"/>
+            <a:off x="0" y="17330323"/>
+            <a:ext cx="30275213" cy="830997"/>
           </a:xfrm>
           <a:prstGeom prst="rect">
             <a:avLst/>
@@ -3732,7 +4110,7 @@
           <a:p>
             <a:pPr algn="ctr"/>
             <a:r>
-              <a:rPr lang="en-US" sz="4204" b="1" dirty="0">
+              <a:rPr lang="en-US" sz="4800" b="1" dirty="0">
                 <a:solidFill>
                   <a:schemeClr val="bg1"/>
                 </a:solidFill>
@@ -3742,7 +4120,7 @@
               </a:rPr>
               <a:t>Results</a:t>
             </a:r>
-            <a:endParaRPr lang="en-US" sz="4204" dirty="0">
+            <a:endParaRPr lang="en-US" sz="4800" dirty="0">
               <a:solidFill>
                 <a:schemeClr val="bg1"/>
               </a:solidFill>
@@ -3767,10 +4145,10 @@
         </p:nvGrpSpPr>
         <p:grpSpPr>
           <a:xfrm>
-            <a:off x="15646381" y="29360308"/>
-            <a:ext cx="14001724" cy="10765031"/>
-            <a:chOff x="656314" y="7439275"/>
-            <a:chExt cx="3166054" cy="3109568"/>
+            <a:off x="4" y="34167033"/>
+            <a:ext cx="30264512" cy="10959191"/>
+            <a:chOff x="655195" y="7439275"/>
+            <a:chExt cx="3167173" cy="2764545"/>
           </a:xfrm>
         </p:grpSpPr>
         <p:sp>
@@ -3788,7 +4166,7 @@
           <p:spPr>
             <a:xfrm>
               <a:off x="656314" y="7439275"/>
-              <a:ext cx="3166054" cy="213554"/>
+              <a:ext cx="3166054" cy="240040"/>
             </a:xfrm>
             <a:prstGeom prst="rect">
               <a:avLst/>
@@ -3808,7 +4186,7 @@
             <a:p>
               <a:pPr algn="ctr"/>
               <a:r>
-                <a:rPr lang="en-US" sz="4204" b="1" dirty="0">
+                <a:rPr lang="en-US" sz="4800" b="1" dirty="0">
                   <a:solidFill>
                     <a:schemeClr val="bg1"/>
                   </a:solidFill>
@@ -3818,7 +4196,7 @@
                 </a:rPr>
                 <a:t>Conclusions</a:t>
               </a:r>
-              <a:endParaRPr lang="en-US" sz="4204" dirty="0">
+              <a:endParaRPr lang="en-US" sz="4800" dirty="0">
                 <a:solidFill>
                   <a:schemeClr val="bg1"/>
                 </a:solidFill>
@@ -3843,8 +4221,8 @@
           </p:nvSpPr>
           <p:spPr>
             <a:xfrm>
-              <a:off x="706536" y="7787207"/>
-              <a:ext cx="3062033" cy="2761636"/>
+              <a:off x="655195" y="7666309"/>
+              <a:ext cx="3062033" cy="2537511"/>
             </a:xfrm>
             <a:prstGeom prst="rect">
               <a:avLst/>
@@ -3860,16 +4238,16 @@
                 <a:spcAft>
                   <a:spcPts val="3401"/>
                 </a:spcAft>
-                <a:buFont typeface="Wingdings" pitchFamily="2" charset="2"/>
-                <a:buChar char="v"/>
+                <a:buFont typeface="Wingdings" panose="05000000000000000000" pitchFamily="2" charset="2"/>
+                <a:buChar char="Ø"/>
               </a:pPr>
               <a:r>
-                <a:rPr lang="en-US" sz="3603" dirty="0">
+                <a:rPr lang="en-US" sz="3000" dirty="0">
                   <a:latin typeface="Arial" charset="0"/>
                   <a:ea typeface="Arial" charset="0"/>
                   <a:cs typeface="Arial" charset="0"/>
                 </a:rPr>
-                <a:t>Based on the highly significant p-value (tested against alpha=.05), the null hypothesis was rejected</a:t>
+                <a:t>Based on highly significant p-values of two-sided independent t-tests, we concluded that CPMT score and time means are significantly different between lower and upper IQ, but not between lower and upper ICV</a:t>
               </a:r>
             </a:p>
             <a:p>
@@ -3877,16 +4255,16 @@
                 <a:spcAft>
                   <a:spcPts val="3401"/>
                 </a:spcAft>
-                <a:buFont typeface="Wingdings" pitchFamily="2" charset="2"/>
-                <a:buChar char="v"/>
+                <a:buFont typeface="Wingdings" panose="05000000000000000000" pitchFamily="2" charset="2"/>
+                <a:buChar char="Ø"/>
               </a:pPr>
               <a:r>
-                <a:rPr lang="en-US" sz="3603" dirty="0">
+                <a:rPr lang="en-US" sz="3000" dirty="0">
                   <a:latin typeface="Arial" charset="0"/>
                   <a:ea typeface="Arial" charset="0"/>
                   <a:cs typeface="Arial" charset="0"/>
                 </a:rPr>
-                <a:t>Girls and boys in primary school do differ in their school goals</a:t>
+                <a:t>This allowed us to use repeated measures ANOVA for RSI and RTI comparisons, but differences in score and time means for lower and upper IQ introduced a new level into our data, therefore we decided to fit a random intercept model and then use one-sided independent t-tests</a:t>
               </a:r>
             </a:p>
             <a:p>
@@ -3894,16 +4272,16 @@
                 <a:spcAft>
                   <a:spcPts val="3401"/>
                 </a:spcAft>
-                <a:buFont typeface="Wingdings" pitchFamily="2" charset="2"/>
-                <a:buChar char="v"/>
+                <a:buFont typeface="Wingdings" panose="05000000000000000000" pitchFamily="2" charset="2"/>
+                <a:buChar char="Ø"/>
               </a:pPr>
               <a:r>
-                <a:rPr lang="en-US" sz="3603" dirty="0">
+                <a:rPr lang="en-US" sz="3000" dirty="0">
                   <a:latin typeface="Arial" charset="0"/>
                   <a:ea typeface="Arial" charset="0"/>
                   <a:cs typeface="Arial" charset="0"/>
                 </a:rPr>
-                <a:t>Girls were more likely than boys to pursue sports and boys more likely to pursue popularity; both were equally likely to pursue good grades</a:t>
+                <a:t>Familiarity with the test over time seems to increase means of RSIs and decreased means of RTIs across ICV, as proven by significant p-values for RSI and RTI tests</a:t>
               </a:r>
             </a:p>
             <a:p>
@@ -3911,16 +4289,16 @@
                 <a:spcAft>
                   <a:spcPts val="3401"/>
                 </a:spcAft>
-                <a:buFont typeface="Wingdings" pitchFamily="2" charset="2"/>
-                <a:buChar char="v"/>
+                <a:buFont typeface="Wingdings" panose="05000000000000000000" pitchFamily="2" charset="2"/>
+                <a:buChar char="Ø"/>
               </a:pPr>
               <a:r>
-                <a:rPr lang="en-US" sz="3603" dirty="0">
+                <a:rPr lang="en-US" sz="3000" dirty="0">
                   <a:latin typeface="Arial" charset="0"/>
                   <a:ea typeface="Arial" charset="0"/>
                   <a:cs typeface="Arial" charset="0"/>
                 </a:rPr>
-                <a:t>Further research is needed to test generalizability of these results in other geographic areas and across ages</a:t>
+                <a:t>There was an increase within means of RSIs in between lower and upper IQ, also due to the familiarity effect, however between same groups decrease within means of RTIs had not been observed</a:t>
               </a:r>
             </a:p>
             <a:p>
@@ -3928,16 +4306,16 @@
                 <a:spcAft>
                   <a:spcPts val="3401"/>
                 </a:spcAft>
-                <a:buFont typeface="Wingdings" pitchFamily="2" charset="2"/>
-                <a:buChar char="v"/>
+                <a:buFont typeface="Wingdings" panose="05000000000000000000" pitchFamily="2" charset="2"/>
+                <a:buChar char="Ø"/>
               </a:pPr>
               <a:r>
-                <a:rPr lang="en-US" sz="3603" dirty="0">
+                <a:rPr lang="en-US" sz="3000" dirty="0">
                   <a:latin typeface="Arial" charset="0"/>
                   <a:ea typeface="Arial" charset="0"/>
                   <a:cs typeface="Arial" charset="0"/>
                 </a:rPr>
-                <a:t>Stereotypical gender norms are not supported as an influence on educational outcomes</a:t>
+                <a:t>Further research is needed as nearly 15% of the sample was above absolute z-score of 1.96, proving poor representation of the actual data – study needs an increase in sample size and also take other factors, such as age and sex into consideration, to see if the familiarity effect would develop the same way</a:t>
               </a:r>
             </a:p>
             <a:p>
@@ -3945,8 +4323,25 @@
                 <a:spcAft>
                   <a:spcPts val="3401"/>
                 </a:spcAft>
-                <a:buFont typeface="Wingdings" pitchFamily="2" charset="2"/>
-                <a:buChar char="v"/>
+                <a:buFont typeface="Wingdings" panose="05000000000000000000" pitchFamily="2" charset="2"/>
+                <a:buChar char="Ø"/>
+              </a:pPr>
+              <a:r>
+                <a:rPr lang="en-US" sz="3000" dirty="0">
+                  <a:latin typeface="Arial" charset="0"/>
+                  <a:ea typeface="Arial" charset="0"/>
+                  <a:cs typeface="Arial" charset="0"/>
+                </a:rPr>
+                <a:t>With sufficient statistical power and additional tests for a working multilevel model, we could develop another model to adjust for familiarity in subjects dosed with fish oil</a:t>
+              </a:r>
+            </a:p>
+            <a:p>
+              <a:pPr marL="686383" indent="-686383" algn="just">
+                <a:spcAft>
+                  <a:spcPts val="3401"/>
+                </a:spcAft>
+                <a:buFont typeface="Wingdings" panose="05000000000000000000" pitchFamily="2" charset="2"/>
+                <a:buChar char="Ø"/>
               </a:pPr>
               <a:endParaRPr lang="en-US" sz="3603" dirty="0">
                 <a:latin typeface="Arial" charset="0"/>
@@ -3959,8 +4354,22 @@
                 <a:spcAft>
                   <a:spcPts val="3401"/>
                 </a:spcAft>
-                <a:buFont typeface="Wingdings" pitchFamily="2" charset="2"/>
-                <a:buChar char="v"/>
+                <a:buFont typeface="Wingdings" panose="05000000000000000000" pitchFamily="2" charset="2"/>
+                <a:buChar char="Ø"/>
+              </a:pPr>
+              <a:endParaRPr lang="en-US" sz="3603" dirty="0">
+                <a:latin typeface="Arial" charset="0"/>
+                <a:ea typeface="Arial" charset="0"/>
+                <a:cs typeface="Arial" charset="0"/>
+              </a:endParaRPr>
+            </a:p>
+            <a:p>
+              <a:pPr marL="686383" indent="-686383" algn="just">
+                <a:spcAft>
+                  <a:spcPts val="3401"/>
+                </a:spcAft>
+                <a:buFont typeface="Wingdings" panose="05000000000000000000" pitchFamily="2" charset="2"/>
+                <a:buChar char="Ø"/>
               </a:pPr>
               <a:endParaRPr lang="en-US" sz="3603" dirty="0">
                 <a:latin typeface="Arial" charset="0"/>
@@ -3986,7 +4395,7 @@
           <p:nvPr/>
         </p:nvPicPr>
         <p:blipFill>
-          <a:blip r:embed="rId2"/>
+          <a:blip r:embed="rId3"/>
           <a:stretch>
             <a:fillRect/>
           </a:stretch>
@@ -4015,8 +4424,8 @@
         </p:nvSpPr>
         <p:spPr>
           <a:xfrm>
-            <a:off x="3844" y="41148446"/>
-            <a:ext cx="30264516" cy="1755673"/>
+            <a:off x="3844" y="41952554"/>
+            <a:ext cx="30332658" cy="1755673"/>
           </a:xfrm>
           <a:prstGeom prst="rect">
             <a:avLst/>
@@ -4059,491 +4468,6 @@
           </a:p>
         </p:txBody>
       </p:sp>
-      <p:pic>
-        <p:nvPicPr>
-          <p:cNvPr id="61" name="Picture 60">
-            <a:extLst>
-              <a:ext uri="{FF2B5EF4-FFF2-40B4-BE49-F238E27FC236}">
-                <a16:creationId xmlns:a16="http://schemas.microsoft.com/office/drawing/2014/main" id="{71C6A7D7-7FBC-2442-9D16-DABF846D9728}"/>
-              </a:ext>
-            </a:extLst>
-          </p:cNvPr>
-          <p:cNvPicPr>
-            <a:picLocks noChangeAspect="1"/>
-          </p:cNvPicPr>
-          <p:nvPr/>
-        </p:nvPicPr>
-        <p:blipFill>
-          <a:blip r:embed="rId3"/>
-          <a:stretch>
-            <a:fillRect/>
-          </a:stretch>
-        </p:blipFill>
-        <p:spPr>
-          <a:xfrm>
-            <a:off x="21488580" y="260583"/>
-            <a:ext cx="5487973" cy="1990734"/>
-          </a:xfrm>
-          <a:prstGeom prst="rect">
-            <a:avLst/>
-          </a:prstGeom>
-        </p:spPr>
-      </p:pic>
-      <p:sp>
-        <p:nvSpPr>
-          <p:cNvPr id="66" name="TextBox 65">
-            <a:extLst>
-              <a:ext uri="{FF2B5EF4-FFF2-40B4-BE49-F238E27FC236}">
-                <a16:creationId xmlns:a16="http://schemas.microsoft.com/office/drawing/2014/main" id="{373E9377-85ED-854E-94D7-230088A97A81}"/>
-              </a:ext>
-            </a:extLst>
-          </p:cNvPr>
-          <p:cNvSpPr txBox="1"/>
-          <p:nvPr/>
-        </p:nvSpPr>
-        <p:spPr>
-          <a:xfrm>
-            <a:off x="18737119" y="25025555"/>
-            <a:ext cx="7804427" cy="985783"/>
-          </a:xfrm>
-          <a:prstGeom prst="rect">
-            <a:avLst/>
-          </a:prstGeom>
-          <a:noFill/>
-          <a:ln>
-            <a:noFill/>
-          </a:ln>
-        </p:spPr>
-        <p:txBody>
-          <a:bodyPr wrap="square" lIns="0" tIns="0" rIns="0" bIns="0" rtlCol="0">
-            <a:spAutoFit/>
-          </a:bodyPr>
-          <a:lstStyle/>
-          <a:p>
-            <a:r>
-              <a:rPr lang="en-US" sz="3203" b="1" i="1" dirty="0">
-                <a:latin typeface="Arial" charset="0"/>
-                <a:ea typeface="Arial" charset="0"/>
-                <a:cs typeface="Arial" charset="0"/>
-              </a:rPr>
-              <a:t>Table 1. Frequency of endorsement of preferred school goal by gender.</a:t>
-            </a:r>
-            <a:r>
-              <a:rPr lang="en-US" sz="3203" i="1" dirty="0">
-                <a:latin typeface="Arial" charset="0"/>
-                <a:ea typeface="Arial" charset="0"/>
-                <a:cs typeface="Arial" charset="0"/>
-              </a:rPr>
-              <a:t>.</a:t>
-            </a:r>
-            <a:endParaRPr lang="en-US" sz="3203" b="1" i="1" dirty="0">
-              <a:latin typeface="Arial" charset="0"/>
-              <a:ea typeface="Arial" charset="0"/>
-              <a:cs typeface="Arial" charset="0"/>
-            </a:endParaRPr>
-          </a:p>
-        </p:txBody>
-      </p:sp>
-      <p:graphicFrame>
-        <p:nvGraphicFramePr>
-          <p:cNvPr id="3" name="Table 2">
-            <a:extLst>
-              <a:ext uri="{FF2B5EF4-FFF2-40B4-BE49-F238E27FC236}">
-                <a16:creationId xmlns:a16="http://schemas.microsoft.com/office/drawing/2014/main" id="{39C150E8-2AED-5D49-BF55-61BC75491990}"/>
-              </a:ext>
-            </a:extLst>
-          </p:cNvPr>
-          <p:cNvGraphicFramePr>
-            <a:graphicFrameLocks noGrp="1"/>
-          </p:cNvGraphicFramePr>
-          <p:nvPr>
-            <p:extLst>
-              <p:ext uri="{D42A27DB-BD31-4B8C-83A1-F6EECF244321}">
-                <p14:modId xmlns:p14="http://schemas.microsoft.com/office/powerpoint/2010/main" val="368794136"/>
-              </p:ext>
-            </p:extLst>
-          </p:nvPr>
-        </p:nvGraphicFramePr>
-        <p:xfrm>
-          <a:off x="17123801" y="21440730"/>
-          <a:ext cx="11046885" cy="2904543"/>
-        </p:xfrm>
-        <a:graphic>
-          <a:graphicData uri="http://schemas.openxmlformats.org/drawingml/2006/table">
-            <a:tbl>
-              <a:tblPr firstRow="1" firstCol="1" bandRow="1">
-                <a:tableStyleId>{5C22544A-7EE6-4342-B048-85BDC9FD1C3A}</a:tableStyleId>
-              </a:tblPr>
-              <a:tblGrid>
-                <a:gridCol w="2295140">
-                  <a:extLst>
-                    <a:ext uri="{9D8B030D-6E8A-4147-A177-3AD203B41FA5}">
-                      <a16:colId xmlns:a16="http://schemas.microsoft.com/office/drawing/2014/main" val="1027089261"/>
-                    </a:ext>
-                  </a:extLst>
-                </a:gridCol>
-                <a:gridCol w="2854836">
-                  <a:extLst>
-                    <a:ext uri="{9D8B030D-6E8A-4147-A177-3AD203B41FA5}">
-                      <a16:colId xmlns:a16="http://schemas.microsoft.com/office/drawing/2014/main" val="3517724068"/>
-                    </a:ext>
-                  </a:extLst>
-                </a:gridCol>
-                <a:gridCol w="2852824">
-                  <a:extLst>
-                    <a:ext uri="{9D8B030D-6E8A-4147-A177-3AD203B41FA5}">
-                      <a16:colId xmlns:a16="http://schemas.microsoft.com/office/drawing/2014/main" val="3254753070"/>
-                    </a:ext>
-                  </a:extLst>
-                </a:gridCol>
-                <a:gridCol w="3044085">
-                  <a:extLst>
-                    <a:ext uri="{9D8B030D-6E8A-4147-A177-3AD203B41FA5}">
-                      <a16:colId xmlns:a16="http://schemas.microsoft.com/office/drawing/2014/main" val="851102502"/>
-                    </a:ext>
-                  </a:extLst>
-                </a:gridCol>
-              </a:tblGrid>
-              <a:tr h="968181">
-                <a:tc>
-                  <a:txBody>
-                    <a:bodyPr/>
-                    <a:lstStyle/>
-                    <a:p>
-                      <a:pPr>
-                        <a:spcAft>
-                          <a:spcPts val="0"/>
-                        </a:spcAft>
-                      </a:pPr>
-                      <a:r>
-                        <a:rPr lang="en-US" sz="4000" dirty="0">
-                          <a:effectLst/>
-                        </a:rPr>
-                        <a:t> </a:t>
-                      </a:r>
-                      <a:endParaRPr lang="en-US" sz="5400" dirty="0">
-                        <a:effectLst/>
-                        <a:latin typeface="Times New Roman" panose="02020603050405020304" pitchFamily="18" charset="0"/>
-                        <a:ea typeface="Times New Roman" panose="02020603050405020304" pitchFamily="18" charset="0"/>
-                        <a:cs typeface="Times New Roman" panose="02020603050405020304" pitchFamily="18" charset="0"/>
-                      </a:endParaRPr>
-                    </a:p>
-                  </a:txBody>
-                  <a:tcPr marL="68580" marR="68580" marT="0" marB="0"/>
-                </a:tc>
-                <a:tc>
-                  <a:txBody>
-                    <a:bodyPr/>
-                    <a:lstStyle/>
-                    <a:p>
-                      <a:pPr>
-                        <a:spcAft>
-                          <a:spcPts val="0"/>
-                        </a:spcAft>
-                      </a:pPr>
-                      <a:r>
-                        <a:rPr lang="en-US" sz="4000" dirty="0">
-                          <a:effectLst/>
-                        </a:rPr>
-                        <a:t>Grades</a:t>
-                      </a:r>
-                      <a:endParaRPr lang="en-US" sz="5400" dirty="0">
-                        <a:effectLst/>
-                        <a:latin typeface="Times New Roman" panose="02020603050405020304" pitchFamily="18" charset="0"/>
-                        <a:ea typeface="Times New Roman" panose="02020603050405020304" pitchFamily="18" charset="0"/>
-                        <a:cs typeface="Times New Roman" panose="02020603050405020304" pitchFamily="18" charset="0"/>
-                      </a:endParaRPr>
-                    </a:p>
-                  </a:txBody>
-                  <a:tcPr marL="68580" marR="68580" marT="0" marB="0"/>
-                </a:tc>
-                <a:tc>
-                  <a:txBody>
-                    <a:bodyPr/>
-                    <a:lstStyle/>
-                    <a:p>
-                      <a:pPr>
-                        <a:spcAft>
-                          <a:spcPts val="0"/>
-                        </a:spcAft>
-                      </a:pPr>
-                      <a:r>
-                        <a:rPr lang="en-US" sz="4000">
-                          <a:effectLst/>
-                        </a:rPr>
-                        <a:t>Popular</a:t>
-                      </a:r>
-                      <a:endParaRPr lang="en-US" sz="5400">
-                        <a:effectLst/>
-                        <a:latin typeface="Times New Roman" panose="02020603050405020304" pitchFamily="18" charset="0"/>
-                        <a:ea typeface="Times New Roman" panose="02020603050405020304" pitchFamily="18" charset="0"/>
-                        <a:cs typeface="Times New Roman" panose="02020603050405020304" pitchFamily="18" charset="0"/>
-                      </a:endParaRPr>
-                    </a:p>
-                  </a:txBody>
-                  <a:tcPr marL="68580" marR="68580" marT="0" marB="0"/>
-                </a:tc>
-                <a:tc>
-                  <a:txBody>
-                    <a:bodyPr/>
-                    <a:lstStyle/>
-                    <a:p>
-                      <a:pPr>
-                        <a:spcAft>
-                          <a:spcPts val="0"/>
-                        </a:spcAft>
-                      </a:pPr>
-                      <a:r>
-                        <a:rPr lang="en-US" sz="4000">
-                          <a:effectLst/>
-                        </a:rPr>
-                        <a:t>Sports</a:t>
-                      </a:r>
-                      <a:endParaRPr lang="en-US" sz="5400">
-                        <a:effectLst/>
-                        <a:latin typeface="Times New Roman" panose="02020603050405020304" pitchFamily="18" charset="0"/>
-                        <a:ea typeface="Times New Roman" panose="02020603050405020304" pitchFamily="18" charset="0"/>
-                        <a:cs typeface="Times New Roman" panose="02020603050405020304" pitchFamily="18" charset="0"/>
-                      </a:endParaRPr>
-                    </a:p>
-                  </a:txBody>
-                  <a:tcPr marL="68580" marR="68580" marT="0" marB="0"/>
-                </a:tc>
-                <a:extLst>
-                  <a:ext uri="{0D108BD9-81ED-4DB2-BD59-A6C34878D82A}">
-                    <a16:rowId xmlns:a16="http://schemas.microsoft.com/office/drawing/2014/main" val="1953528166"/>
-                  </a:ext>
-                </a:extLst>
-              </a:tr>
-              <a:tr h="968181">
-                <a:tc>
-                  <a:txBody>
-                    <a:bodyPr/>
-                    <a:lstStyle/>
-                    <a:p>
-                      <a:pPr>
-                        <a:spcAft>
-                          <a:spcPts val="0"/>
-                        </a:spcAft>
-                      </a:pPr>
-                      <a:r>
-                        <a:rPr lang="en-US" sz="4000">
-                          <a:effectLst/>
-                        </a:rPr>
-                        <a:t>Boy</a:t>
-                      </a:r>
-                      <a:endParaRPr lang="en-US" sz="5400">
-                        <a:effectLst/>
-                        <a:latin typeface="Times New Roman" panose="02020603050405020304" pitchFamily="18" charset="0"/>
-                        <a:ea typeface="Times New Roman" panose="02020603050405020304" pitchFamily="18" charset="0"/>
-                        <a:cs typeface="Times New Roman" panose="02020603050405020304" pitchFamily="18" charset="0"/>
-                      </a:endParaRPr>
-                    </a:p>
-                  </a:txBody>
-                  <a:tcPr marL="68580" marR="68580" marT="0" marB="0"/>
-                </a:tc>
-                <a:tc>
-                  <a:txBody>
-                    <a:bodyPr/>
-                    <a:lstStyle/>
-                    <a:p>
-                      <a:pPr>
-                        <a:spcAft>
-                          <a:spcPts val="0"/>
-                        </a:spcAft>
-                      </a:pPr>
-                      <a:r>
-                        <a:rPr lang="en-US" sz="4000" dirty="0">
-                          <a:effectLst/>
-                        </a:rPr>
-                        <a:t>117</a:t>
-                      </a:r>
-                      <a:endParaRPr lang="en-US" sz="5400" dirty="0">
-                        <a:effectLst/>
-                        <a:latin typeface="Times New Roman" panose="02020603050405020304" pitchFamily="18" charset="0"/>
-                        <a:ea typeface="Times New Roman" panose="02020603050405020304" pitchFamily="18" charset="0"/>
-                        <a:cs typeface="Times New Roman" panose="02020603050405020304" pitchFamily="18" charset="0"/>
-                      </a:endParaRPr>
-                    </a:p>
-                  </a:txBody>
-                  <a:tcPr marL="68580" marR="68580" marT="0" marB="0"/>
-                </a:tc>
-                <a:tc>
-                  <a:txBody>
-                    <a:bodyPr/>
-                    <a:lstStyle/>
-                    <a:p>
-                      <a:pPr>
-                        <a:spcAft>
-                          <a:spcPts val="0"/>
-                        </a:spcAft>
-                      </a:pPr>
-                      <a:r>
-                        <a:rPr lang="en-US" sz="4000" dirty="0">
-                          <a:effectLst/>
-                          <a:latin typeface="Times New Roman" panose="02020603050405020304" pitchFamily="18" charset="0"/>
-                          <a:ea typeface="Times New Roman" panose="02020603050405020304" pitchFamily="18" charset="0"/>
-                          <a:cs typeface="Times New Roman" panose="02020603050405020304" pitchFamily="18" charset="0"/>
-                        </a:rPr>
-                        <a:t>60</a:t>
-                      </a:r>
-                      <a:endParaRPr lang="en-US" sz="5400" dirty="0">
-                        <a:effectLst/>
-                        <a:latin typeface="Times New Roman" panose="02020603050405020304" pitchFamily="18" charset="0"/>
-                        <a:ea typeface="Times New Roman" panose="02020603050405020304" pitchFamily="18" charset="0"/>
-                        <a:cs typeface="Times New Roman" panose="02020603050405020304" pitchFamily="18" charset="0"/>
-                      </a:endParaRPr>
-                    </a:p>
-                  </a:txBody>
-                  <a:tcPr marL="68580" marR="68580" marT="0" marB="0"/>
-                </a:tc>
-                <a:tc>
-                  <a:txBody>
-                    <a:bodyPr/>
-                    <a:lstStyle/>
-                    <a:p>
-                      <a:pPr>
-                        <a:spcAft>
-                          <a:spcPts val="0"/>
-                        </a:spcAft>
-                      </a:pPr>
-                      <a:r>
-                        <a:rPr lang="en-US" sz="4000" dirty="0">
-                          <a:effectLst/>
-                        </a:rPr>
-                        <a:t>50</a:t>
-                      </a:r>
-                      <a:endParaRPr lang="en-US" sz="5400" dirty="0">
-                        <a:effectLst/>
-                        <a:latin typeface="Times New Roman" panose="02020603050405020304" pitchFamily="18" charset="0"/>
-                        <a:ea typeface="Times New Roman" panose="02020603050405020304" pitchFamily="18" charset="0"/>
-                        <a:cs typeface="Times New Roman" panose="02020603050405020304" pitchFamily="18" charset="0"/>
-                      </a:endParaRPr>
-                    </a:p>
-                  </a:txBody>
-                  <a:tcPr marL="68580" marR="68580" marT="0" marB="0"/>
-                </a:tc>
-                <a:extLst>
-                  <a:ext uri="{0D108BD9-81ED-4DB2-BD59-A6C34878D82A}">
-                    <a16:rowId xmlns:a16="http://schemas.microsoft.com/office/drawing/2014/main" val="1380053246"/>
-                  </a:ext>
-                </a:extLst>
-              </a:tr>
-              <a:tr h="968181">
-                <a:tc>
-                  <a:txBody>
-                    <a:bodyPr/>
-                    <a:lstStyle/>
-                    <a:p>
-                      <a:pPr>
-                        <a:spcAft>
-                          <a:spcPts val="0"/>
-                        </a:spcAft>
-                      </a:pPr>
-                      <a:r>
-                        <a:rPr lang="en-US" sz="4000" dirty="0">
-                          <a:effectLst/>
-                        </a:rPr>
-                        <a:t>Girl</a:t>
-                      </a:r>
-                      <a:endParaRPr lang="en-US" sz="5400" dirty="0">
-                        <a:effectLst/>
-                        <a:latin typeface="Times New Roman" panose="02020603050405020304" pitchFamily="18" charset="0"/>
-                        <a:ea typeface="Times New Roman" panose="02020603050405020304" pitchFamily="18" charset="0"/>
-                        <a:cs typeface="Times New Roman" panose="02020603050405020304" pitchFamily="18" charset="0"/>
-                      </a:endParaRPr>
-                    </a:p>
-                  </a:txBody>
-                  <a:tcPr marL="68580" marR="68580" marT="0" marB="0"/>
-                </a:tc>
-                <a:tc>
-                  <a:txBody>
-                    <a:bodyPr/>
-                    <a:lstStyle/>
-                    <a:p>
-                      <a:pPr>
-                        <a:spcAft>
-                          <a:spcPts val="0"/>
-                        </a:spcAft>
-                      </a:pPr>
-                      <a:r>
-                        <a:rPr lang="en-US" sz="4000" dirty="0">
-                          <a:effectLst/>
-                        </a:rPr>
-                        <a:t>130</a:t>
-                      </a:r>
-                      <a:endParaRPr lang="en-US" sz="5400" dirty="0">
-                        <a:effectLst/>
-                        <a:latin typeface="Times New Roman" panose="02020603050405020304" pitchFamily="18" charset="0"/>
-                        <a:ea typeface="Times New Roman" panose="02020603050405020304" pitchFamily="18" charset="0"/>
-                        <a:cs typeface="Times New Roman" panose="02020603050405020304" pitchFamily="18" charset="0"/>
-                      </a:endParaRPr>
-                    </a:p>
-                  </a:txBody>
-                  <a:tcPr marL="68580" marR="68580" marT="0" marB="0"/>
-                </a:tc>
-                <a:tc>
-                  <a:txBody>
-                    <a:bodyPr/>
-                    <a:lstStyle/>
-                    <a:p>
-                      <a:pPr>
-                        <a:spcAft>
-                          <a:spcPts val="0"/>
-                        </a:spcAft>
-                      </a:pPr>
-                      <a:r>
-                        <a:rPr lang="en-US" sz="4000" dirty="0">
-                          <a:effectLst/>
-                        </a:rPr>
-                        <a:t>30</a:t>
-                      </a:r>
-                      <a:endParaRPr lang="en-US" sz="5400" dirty="0">
-                        <a:effectLst/>
-                        <a:latin typeface="Times New Roman" panose="02020603050405020304" pitchFamily="18" charset="0"/>
-                        <a:ea typeface="Times New Roman" panose="02020603050405020304" pitchFamily="18" charset="0"/>
-                        <a:cs typeface="Times New Roman" panose="02020603050405020304" pitchFamily="18" charset="0"/>
-                      </a:endParaRPr>
-                    </a:p>
-                  </a:txBody>
-                  <a:tcPr marL="68580" marR="68580" marT="0" marB="0"/>
-                </a:tc>
-                <a:tc>
-                  <a:txBody>
-                    <a:bodyPr/>
-                    <a:lstStyle/>
-                    <a:p>
-                      <a:pPr>
-                        <a:spcAft>
-                          <a:spcPts val="0"/>
-                        </a:spcAft>
-                      </a:pPr>
-                      <a:r>
-                        <a:rPr lang="en-US" sz="4000" dirty="0">
-                          <a:effectLst/>
-                        </a:rPr>
-                        <a:t>91</a:t>
-                      </a:r>
-                      <a:endParaRPr lang="en-US" sz="5400" dirty="0">
-                        <a:effectLst/>
-                        <a:latin typeface="Times New Roman" panose="02020603050405020304" pitchFamily="18" charset="0"/>
-                        <a:ea typeface="Times New Roman" panose="02020603050405020304" pitchFamily="18" charset="0"/>
-                        <a:cs typeface="Times New Roman" panose="02020603050405020304" pitchFamily="18" charset="0"/>
-                      </a:endParaRPr>
-                    </a:p>
-                  </a:txBody>
-                  <a:tcPr marL="68580" marR="68580" marT="0" marB="0"/>
-                </a:tc>
-                <a:extLst>
-                  <a:ext uri="{0D108BD9-81ED-4DB2-BD59-A6C34878D82A}">
-                    <a16:rowId xmlns:a16="http://schemas.microsoft.com/office/drawing/2014/main" val="821875989"/>
-                  </a:ext>
-                </a:extLst>
-              </a:tr>
-            </a:tbl>
-          </a:graphicData>
-        </a:graphic>
-      </p:graphicFrame>
       <p:sp>
         <p:nvSpPr>
           <p:cNvPr id="32" name="Rectangle 31">
@@ -4558,8 +4482,8 @@
         </p:nvSpPr>
         <p:spPr>
           <a:xfrm>
-            <a:off x="779155" y="21343807"/>
-            <a:ext cx="13541700" cy="4890333"/>
+            <a:off x="480245" y="23309717"/>
+            <a:ext cx="29139531" cy="1954401"/>
           </a:xfrm>
           <a:prstGeom prst="rect">
             <a:avLst/>
@@ -4575,8 +4499,8 @@
               <a:spcAft>
                 <a:spcPts val="2801"/>
               </a:spcAft>
-              <a:buFont typeface="Wingdings" pitchFamily="2" charset="2"/>
-              <a:buChar char="v"/>
+              <a:buFont typeface="Wingdings" panose="05000000000000000000" pitchFamily="2" charset="2"/>
+              <a:buChar char="Ø"/>
             </a:pPr>
             <a:r>
               <a:rPr lang="en-US" sz="3603" dirty="0">
@@ -4587,17 +4511,19 @@
                 <a:ea typeface="Arial" charset="0"/>
                 <a:cs typeface="Arial" charset="0"/>
               </a:rPr>
-              <a:t>Getting good grades was the most frequently preferred goal for both genders (Table 1)</a:t>
-            </a:r>
-          </a:p>
-          <a:p>
-            <a:pPr marL="686383" indent="-686383" algn="just">
-              <a:spcAft>
-                <a:spcPts val="2801"/>
-              </a:spcAft>
-              <a:buFont typeface="Wingdings" pitchFamily="2" charset="2"/>
-              <a:buChar char="v"/>
-            </a:pPr>
+              <a:t>Score means at baseline and at each week were significantly different between lower and upper IQ: </a:t>
+            </a:r>
+            <a:r>
+              <a:rPr lang="en-US" sz="3603" i="1" dirty="0">
+                <a:solidFill>
+                  <a:sysClr val="windowText" lastClr="000000"/>
+                </a:solidFill>
+                <a:latin typeface="Arial" charset="0"/>
+                <a:ea typeface="Arial" charset="0"/>
+                <a:cs typeface="Arial" charset="0"/>
+              </a:rPr>
+              <a:t>t(298)= -7.44, p= 1.08e-12</a:t>
+            </a:r>
             <a:r>
               <a:rPr lang="en-US" sz="3603" dirty="0">
                 <a:solidFill>
@@ -4607,139 +4533,19 @@
                 <a:ea typeface="Arial" charset="0"/>
                 <a:cs typeface="Arial" charset="0"/>
               </a:rPr>
-              <a:t>The chi-square test showed significant differences in preferred goals by gender:</a:t>
-            </a:r>
-            <a:r>
-              <a:rPr lang="en-US" sz="3600" dirty="0">
+              <a:t>, same for time means: </a:t>
+            </a:r>
+            <a:r>
+              <a:rPr lang="en-US" sz="3603" i="1" dirty="0">
                 <a:solidFill>
                   <a:sysClr val="windowText" lastClr="000000"/>
                 </a:solidFill>
-                <a:latin typeface="Arial" panose="020B0604020202020204" pitchFamily="34" charset="0"/>
+                <a:latin typeface="Arial" charset="0"/>
                 <a:ea typeface="Arial" charset="0"/>
-                <a:cs typeface="Arial" panose="020B0604020202020204" pitchFamily="34" charset="0"/>
+                <a:cs typeface="Arial" charset="0"/>
               </a:rPr>
-              <a:t> </a:t>
-            </a:r>
-            <a:r>
-              <a:rPr lang="en-GB" sz="3600" dirty="0">
-                <a:solidFill>
-                  <a:sysClr val="windowText" lastClr="000000"/>
-                </a:solidFill>
-                <a:latin typeface="Arial" panose="020B0604020202020204" pitchFamily="34" charset="0"/>
-                <a:cs typeface="Arial" panose="020B0604020202020204" pitchFamily="34" charset="0"/>
-                <a:sym typeface="Symbol" pitchFamily="2" charset="2"/>
-              </a:rPr>
-              <a:t></a:t>
-            </a:r>
-            <a:r>
-              <a:rPr lang="en-GB" sz="3600" baseline="30000" dirty="0">
-                <a:solidFill>
-                  <a:sysClr val="windowText" lastClr="000000"/>
-                </a:solidFill>
-                <a:latin typeface="Arial" panose="020B0604020202020204" pitchFamily="34" charset="0"/>
-                <a:cs typeface="Arial" panose="020B0604020202020204" pitchFamily="34" charset="0"/>
-              </a:rPr>
-              <a:t>2</a:t>
-            </a:r>
-            <a:r>
-              <a:rPr lang="en-US" sz="3600" dirty="0">
-                <a:solidFill>
-                  <a:sysClr val="windowText" lastClr="000000"/>
-                </a:solidFill>
-                <a:latin typeface="Arial" panose="020B0604020202020204" pitchFamily="34" charset="0"/>
-                <a:cs typeface="Arial" panose="020B0604020202020204" pitchFamily="34" charset="0"/>
-              </a:rPr>
-              <a:t>(2) = 21.46, </a:t>
-            </a:r>
-            <a:r>
-              <a:rPr lang="en-US" sz="3600" i="1" dirty="0">
-                <a:solidFill>
-                  <a:sysClr val="windowText" lastClr="000000"/>
-                </a:solidFill>
-                <a:latin typeface="Arial" panose="020B0604020202020204" pitchFamily="34" charset="0"/>
-                <a:cs typeface="Arial" panose="020B0604020202020204" pitchFamily="34" charset="0"/>
-              </a:rPr>
-              <a:t>p</a:t>
-            </a:r>
-            <a:r>
-              <a:rPr lang="en-US" sz="3600" dirty="0">
-                <a:solidFill>
-                  <a:sysClr val="windowText" lastClr="000000"/>
-                </a:solidFill>
-                <a:latin typeface="Arial" panose="020B0604020202020204" pitchFamily="34" charset="0"/>
-                <a:cs typeface="Arial" panose="020B0604020202020204" pitchFamily="34" charset="0"/>
-              </a:rPr>
-              <a:t> = </a:t>
-            </a:r>
-            <a:r>
-              <a:rPr lang="en-GB" sz="3600" i="1" dirty="0">
-                <a:solidFill>
-                  <a:sysClr val="windowText" lastClr="000000"/>
-                </a:solidFill>
-                <a:latin typeface="Arial" panose="020B0604020202020204" pitchFamily="34" charset="0"/>
-                <a:ea typeface="Times New Roman" panose="02020603050405020304" pitchFamily="18" charset="0"/>
-              </a:rPr>
-              <a:t> 2 </a:t>
-            </a:r>
-            <a:r>
-              <a:rPr lang="en-GB" sz="3600" i="1" dirty="0">
-                <a:solidFill>
-                  <a:sysClr val="windowText" lastClr="000000"/>
-                </a:solidFill>
-                <a:latin typeface="Arial" panose="020B0604020202020204" pitchFamily="34" charset="0"/>
-                <a:ea typeface="Times New Roman" panose="02020603050405020304" pitchFamily="18" charset="0"/>
-                <a:cs typeface="Arial" panose="020B0604020202020204" pitchFamily="34" charset="0"/>
-                <a:sym typeface="Symbol" pitchFamily="2" charset="2"/>
-              </a:rPr>
-              <a:t></a:t>
-            </a:r>
-            <a:r>
-              <a:rPr lang="en-GB" sz="3600" i="1" dirty="0">
-                <a:solidFill>
-                  <a:sysClr val="windowText" lastClr="000000"/>
-                </a:solidFill>
-                <a:latin typeface="Arial" panose="020B0604020202020204" pitchFamily="34" charset="0"/>
-                <a:ea typeface="Times New Roman" panose="02020603050405020304" pitchFamily="18" charset="0"/>
-              </a:rPr>
-              <a:t> 10</a:t>
-            </a:r>
-            <a:r>
-              <a:rPr lang="en-GB" sz="3600" i="1" baseline="30000" dirty="0">
-                <a:solidFill>
-                  <a:sysClr val="windowText" lastClr="000000"/>
-                </a:solidFill>
-                <a:latin typeface="Arial" panose="020B0604020202020204" pitchFamily="34" charset="0"/>
-                <a:ea typeface="Times New Roman" panose="02020603050405020304" pitchFamily="18" charset="0"/>
-              </a:rPr>
-              <a:t>-5</a:t>
-            </a:r>
-            <a:r>
-              <a:rPr lang="en-US" sz="3600" dirty="0">
-                <a:solidFill>
-                  <a:sysClr val="windowText" lastClr="000000"/>
-                </a:solidFill>
-                <a:latin typeface="Arial" panose="020B0604020202020204" pitchFamily="34" charset="0"/>
-                <a:cs typeface="Arial" panose="020B0604020202020204" pitchFamily="34" charset="0"/>
-              </a:rPr>
-              <a:t> </a:t>
-            </a:r>
-            <a:endParaRPr lang="en-US" sz="3600" dirty="0">
-              <a:solidFill>
-                <a:sysClr val="windowText" lastClr="000000"/>
-              </a:solidFill>
-              <a:latin typeface="Arial" panose="020B0604020202020204" pitchFamily="34" charset="0"/>
-              <a:ea typeface="Arial" charset="0"/>
-              <a:cs typeface="Arial" panose="020B0604020202020204" pitchFamily="34" charset="0"/>
-            </a:endParaRPr>
-          </a:p>
-          <a:p>
-            <a:pPr marL="686383" indent="-686383" algn="just">
-              <a:spcAft>
-                <a:spcPts val="2801"/>
-              </a:spcAft>
-              <a:buFont typeface="Wingdings" pitchFamily="2" charset="2"/>
-              <a:buChar char="v"/>
-            </a:pPr>
+              <a:t>t(298)= 3.56, p= 4.3e-04</a:t>
+            </a:r>
             <a:r>
               <a:rPr lang="en-US" sz="3603" dirty="0">
                 <a:solidFill>
@@ -4749,17 +4555,80 @@
                 <a:ea typeface="Arial" charset="0"/>
                 <a:cs typeface="Arial" charset="0"/>
               </a:rPr>
-              <a:t>Comparing the observed to expected counts, girls preferred sports more than expected while boys preferred popularity more than expected (Figure 1)</a:t>
-            </a:r>
+              <a:t>, but not mean scores </a:t>
+            </a:r>
+            <a:r>
+              <a:rPr lang="fr-FR" sz="3603" i="1" dirty="0">
+                <a:solidFill>
+                  <a:sysClr val="windowText" lastClr="000000"/>
+                </a:solidFill>
+                <a:latin typeface="Arial" charset="0"/>
+                <a:ea typeface="Arial" charset="0"/>
+                <a:cs typeface="Arial" charset="0"/>
+              </a:rPr>
+              <a:t>t(298)= -0.29, p= 0.77 </a:t>
+            </a:r>
+            <a:r>
+              <a:rPr lang="en-US" sz="3603" dirty="0">
+                <a:solidFill>
+                  <a:sysClr val="windowText" lastClr="000000"/>
+                </a:solidFill>
+                <a:latin typeface="Arial" charset="0"/>
+                <a:ea typeface="Arial" charset="0"/>
+                <a:cs typeface="Arial" charset="0"/>
+              </a:rPr>
+              <a:t>and times </a:t>
+            </a:r>
+            <a:r>
+              <a:rPr lang="fr-FR" sz="3603" i="1" dirty="0">
+                <a:solidFill>
+                  <a:sysClr val="windowText" lastClr="000000"/>
+                </a:solidFill>
+                <a:latin typeface="Arial" charset="0"/>
+                <a:ea typeface="Arial" charset="0"/>
+                <a:cs typeface="Arial" charset="0"/>
+              </a:rPr>
+              <a:t>t(298)=1.52, p=0.13</a:t>
+            </a:r>
+            <a:r>
+              <a:rPr lang="en-US" sz="3603" i="1" dirty="0">
+                <a:solidFill>
+                  <a:sysClr val="windowText" lastClr="000000"/>
+                </a:solidFill>
+                <a:latin typeface="Arial" charset="0"/>
+                <a:ea typeface="Arial" charset="0"/>
+                <a:cs typeface="Arial" charset="0"/>
+              </a:rPr>
+              <a:t> </a:t>
+            </a:r>
+            <a:r>
+              <a:rPr lang="en-US" sz="3603" dirty="0">
+                <a:solidFill>
+                  <a:sysClr val="windowText" lastClr="000000"/>
+                </a:solidFill>
+                <a:latin typeface="Arial" charset="0"/>
+                <a:ea typeface="Arial" charset="0"/>
+                <a:cs typeface="Arial" charset="0"/>
+              </a:rPr>
+              <a:t>between upper and lower ICV (two-sided).</a:t>
+            </a:r>
+            <a:endParaRPr lang="en-US" sz="3603" i="1" dirty="0">
+              <a:solidFill>
+                <a:sysClr val="windowText" lastClr="000000"/>
+              </a:solidFill>
+              <a:latin typeface="Arial" charset="0"/>
+              <a:ea typeface="Arial" charset="0"/>
+              <a:cs typeface="Arial" charset="0"/>
+            </a:endParaRPr>
           </a:p>
         </p:txBody>
       </p:sp>
       <p:pic>
         <p:nvPicPr>
-          <p:cNvPr id="8" name="Picture 7">
+          <p:cNvPr id="21" name="Picture 20">
             <a:extLst>
               <a:ext uri="{FF2B5EF4-FFF2-40B4-BE49-F238E27FC236}">
-                <a16:creationId xmlns:a16="http://schemas.microsoft.com/office/drawing/2014/main" id="{5AD5A932-7557-A743-8E9E-2439EF2914DA}"/>
+                <a16:creationId xmlns:a16="http://schemas.microsoft.com/office/drawing/2014/main" id="{A0A85F2C-01CA-4BED-8F94-6019146B37E9}"/>
               </a:ext>
             </a:extLst>
           </p:cNvPr>
@@ -4776,20 +4645,374 @@
         </p:blipFill>
         <p:spPr>
           <a:xfrm>
-            <a:off x="560516" y="28359278"/>
-            <a:ext cx="14041548" cy="10057538"/>
+            <a:off x="12623218" y="18856639"/>
+            <a:ext cx="5478692" cy="3486440"/>
           </a:xfrm>
           <a:prstGeom prst="rect">
             <a:avLst/>
           </a:prstGeom>
         </p:spPr>
       </p:pic>
-      <p:sp>
-        <p:nvSpPr>
-          <p:cNvPr id="35" name="TextBox 34">
+      <p:pic>
+        <p:nvPicPr>
+          <p:cNvPr id="23" name="Picture 22">
             <a:extLst>
               <a:ext uri="{FF2B5EF4-FFF2-40B4-BE49-F238E27FC236}">
-                <a16:creationId xmlns:a16="http://schemas.microsoft.com/office/drawing/2014/main" id="{273D0648-AA33-7F4B-B6A5-1F6F810BF535}"/>
+                <a16:creationId xmlns:a16="http://schemas.microsoft.com/office/drawing/2014/main" id="{BD1237E3-D35E-4577-A2AE-0CA06B7775AE}"/>
+              </a:ext>
+            </a:extLst>
+          </p:cNvPr>
+          <p:cNvPicPr>
+            <a:picLocks noChangeAspect="1"/>
+          </p:cNvPicPr>
+          <p:nvPr/>
+        </p:nvPicPr>
+        <p:blipFill>
+          <a:blip r:embed="rId5"/>
+          <a:stretch>
+            <a:fillRect/>
+          </a:stretch>
+        </p:blipFill>
+        <p:spPr>
+          <a:xfrm>
+            <a:off x="870739" y="18537037"/>
+            <a:ext cx="10707350" cy="4704745"/>
+          </a:xfrm>
+          <a:prstGeom prst="rect">
+            <a:avLst/>
+          </a:prstGeom>
+        </p:spPr>
+      </p:pic>
+      <p:pic>
+        <p:nvPicPr>
+          <p:cNvPr id="25" name="Picture 24">
+            <a:extLst>
+              <a:ext uri="{FF2B5EF4-FFF2-40B4-BE49-F238E27FC236}">
+                <a16:creationId xmlns:a16="http://schemas.microsoft.com/office/drawing/2014/main" id="{F71055DA-1EB2-4F81-985D-28C7E17C6637}"/>
+              </a:ext>
+            </a:extLst>
+          </p:cNvPr>
+          <p:cNvPicPr>
+            <a:picLocks noChangeAspect="1"/>
+          </p:cNvPicPr>
+          <p:nvPr/>
+        </p:nvPicPr>
+        <p:blipFill>
+          <a:blip r:embed="rId6"/>
+          <a:stretch>
+            <a:fillRect/>
+          </a:stretch>
+        </p:blipFill>
+        <p:spPr>
+          <a:xfrm>
+            <a:off x="18818504" y="18455411"/>
+            <a:ext cx="10692601" cy="4719493"/>
+          </a:xfrm>
+          <a:prstGeom prst="rect">
+            <a:avLst/>
+          </a:prstGeom>
+        </p:spPr>
+      </p:pic>
+      <p:sp>
+        <p:nvSpPr>
+          <p:cNvPr id="37" name="Rectangle 36">
+            <a:extLst>
+              <a:ext uri="{FF2B5EF4-FFF2-40B4-BE49-F238E27FC236}">
+                <a16:creationId xmlns:a16="http://schemas.microsoft.com/office/drawing/2014/main" id="{85A73D07-EE90-47C6-8278-36905A6158E5}"/>
+              </a:ext>
+            </a:extLst>
+          </p:cNvPr>
+          <p:cNvSpPr/>
+          <p:nvPr/>
+        </p:nvSpPr>
+        <p:spPr>
+          <a:xfrm>
+            <a:off x="17558222" y="25842899"/>
+            <a:ext cx="12089882" cy="3617741"/>
+          </a:xfrm>
+          <a:prstGeom prst="rect">
+            <a:avLst/>
+          </a:prstGeom>
+        </p:spPr>
+        <p:txBody>
+          <a:bodyPr wrap="square" lIns="144123" tIns="144123" rIns="144123" bIns="144123" anchor="t">
+            <a:spAutoFit/>
+          </a:bodyPr>
+          <a:lstStyle/>
+          <a:p>
+            <a:pPr marL="686383" indent="-686383" algn="just">
+              <a:spcAft>
+                <a:spcPts val="2801"/>
+              </a:spcAft>
+              <a:buFont typeface="Wingdings" panose="05000000000000000000" pitchFamily="2" charset="2"/>
+              <a:buChar char="Ø"/>
+            </a:pPr>
+            <a:r>
+              <a:rPr lang="en-US" sz="3603" dirty="0">
+                <a:solidFill>
+                  <a:sysClr val="windowText" lastClr="000000"/>
+                </a:solidFill>
+                <a:latin typeface="Arial" charset="0"/>
+                <a:ea typeface="Arial" charset="0"/>
+                <a:cs typeface="Arial" charset="0"/>
+              </a:rPr>
+              <a:t>Increments were very significant across ICV in RSIs: </a:t>
+            </a:r>
+            <a:r>
+              <a:rPr lang="en-US" sz="3603" i="1" dirty="0">
+                <a:solidFill>
+                  <a:sysClr val="windowText" lastClr="000000"/>
+                </a:solidFill>
+                <a:latin typeface="Arial" charset="0"/>
+                <a:ea typeface="Arial" charset="0"/>
+                <a:cs typeface="Arial" charset="0"/>
+              </a:rPr>
+              <a:t>F(2, 148)= 54.72, p&lt; 1.1e-16</a:t>
+            </a:r>
+            <a:r>
+              <a:rPr lang="en-US" sz="3603" dirty="0">
+                <a:solidFill>
+                  <a:sysClr val="windowText" lastClr="000000"/>
+                </a:solidFill>
+                <a:latin typeface="Arial" charset="0"/>
+                <a:ea typeface="Arial" charset="0"/>
+                <a:cs typeface="Arial" charset="0"/>
+              </a:rPr>
+              <a:t> and decrements in RTIs: </a:t>
+            </a:r>
+            <a:r>
+              <a:rPr lang="en-US" sz="3603" i="1" dirty="0">
+                <a:solidFill>
+                  <a:sysClr val="windowText" lastClr="000000"/>
+                </a:solidFill>
+                <a:latin typeface="Arial" charset="0"/>
+                <a:ea typeface="Arial" charset="0"/>
+                <a:cs typeface="Arial" charset="0"/>
+              </a:rPr>
+              <a:t>F(2, 148)= 56.21, p&lt; 1.1e-16</a:t>
+            </a:r>
+            <a:r>
+              <a:rPr lang="en-US" sz="3603" dirty="0">
+                <a:solidFill>
+                  <a:sysClr val="windowText" lastClr="000000"/>
+                </a:solidFill>
+                <a:latin typeface="Arial" charset="0"/>
+                <a:ea typeface="Arial" charset="0"/>
+                <a:cs typeface="Arial" charset="0"/>
+              </a:rPr>
+              <a:t>, and significant  for different across upper and lower IQ in RSIs increments: </a:t>
+            </a:r>
+            <a:r>
+              <a:rPr lang="en-US" sz="3603" i="1" dirty="0">
+                <a:solidFill>
+                  <a:sysClr val="windowText" lastClr="000000"/>
+                </a:solidFill>
+                <a:latin typeface="Arial" charset="0"/>
+                <a:ea typeface="Arial" charset="0"/>
+                <a:cs typeface="Arial" charset="0"/>
+              </a:rPr>
+              <a:t>t(73)=1.73, p=0.04</a:t>
+            </a:r>
+            <a:r>
+              <a:rPr lang="en-US" sz="3603" dirty="0">
+                <a:solidFill>
+                  <a:sysClr val="windowText" lastClr="000000"/>
+                </a:solidFill>
+                <a:latin typeface="Arial" charset="0"/>
+                <a:ea typeface="Arial" charset="0"/>
+                <a:cs typeface="Arial" charset="0"/>
+              </a:rPr>
+              <a:t>, but not in RTIs decrements: </a:t>
+            </a:r>
+            <a:r>
+              <a:rPr lang="en-US" sz="3603" i="1" dirty="0">
+                <a:solidFill>
+                  <a:sysClr val="windowText" lastClr="000000"/>
+                </a:solidFill>
+                <a:latin typeface="Arial" charset="0"/>
+                <a:ea typeface="Arial" charset="0"/>
+                <a:cs typeface="Arial" charset="0"/>
+              </a:rPr>
+              <a:t>t(73)= 0.04, p=0.51 </a:t>
+            </a:r>
+            <a:r>
+              <a:rPr lang="en-US" sz="3603" dirty="0">
+                <a:solidFill>
+                  <a:sysClr val="windowText" lastClr="000000"/>
+                </a:solidFill>
+                <a:latin typeface="Arial" charset="0"/>
+                <a:ea typeface="Arial" charset="0"/>
+                <a:cs typeface="Arial" charset="0"/>
+              </a:rPr>
+              <a:t>(one-sided).</a:t>
+            </a:r>
+            <a:endParaRPr lang="en-US" sz="3603" i="1" dirty="0">
+              <a:solidFill>
+                <a:sysClr val="windowText" lastClr="000000"/>
+              </a:solidFill>
+              <a:latin typeface="Arial" charset="0"/>
+              <a:ea typeface="Arial" charset="0"/>
+              <a:cs typeface="Arial" charset="0"/>
+            </a:endParaRPr>
+          </a:p>
+        </p:txBody>
+      </p:sp>
+      <p:pic>
+        <p:nvPicPr>
+          <p:cNvPr id="36" name="Picture 35">
+            <a:extLst>
+              <a:ext uri="{FF2B5EF4-FFF2-40B4-BE49-F238E27FC236}">
+                <a16:creationId xmlns:a16="http://schemas.microsoft.com/office/drawing/2014/main" id="{565A39F1-F239-43BA-89BE-AD386FD43EFA}"/>
+              </a:ext>
+            </a:extLst>
+          </p:cNvPr>
+          <p:cNvPicPr>
+            <a:picLocks noChangeAspect="1"/>
+          </p:cNvPicPr>
+          <p:nvPr/>
+        </p:nvPicPr>
+        <p:blipFill>
+          <a:blip r:embed="rId7"/>
+          <a:stretch>
+            <a:fillRect/>
+          </a:stretch>
+        </p:blipFill>
+        <p:spPr>
+          <a:xfrm>
+            <a:off x="294690" y="25923554"/>
+            <a:ext cx="8120570" cy="8033564"/>
+          </a:xfrm>
+          <a:prstGeom prst="rect">
+            <a:avLst/>
+          </a:prstGeom>
+        </p:spPr>
+      </p:pic>
+      <p:pic>
+        <p:nvPicPr>
+          <p:cNvPr id="39" name="Picture 38">
+            <a:extLst>
+              <a:ext uri="{FF2B5EF4-FFF2-40B4-BE49-F238E27FC236}">
+                <a16:creationId xmlns:a16="http://schemas.microsoft.com/office/drawing/2014/main" id="{D3A53772-B5CA-4FC5-99A7-F3D04464709B}"/>
+              </a:ext>
+            </a:extLst>
+          </p:cNvPr>
+          <p:cNvPicPr>
+            <a:picLocks noChangeAspect="1"/>
+          </p:cNvPicPr>
+          <p:nvPr/>
+        </p:nvPicPr>
+        <p:blipFill>
+          <a:blip r:embed="rId8"/>
+          <a:stretch>
+            <a:fillRect/>
+          </a:stretch>
+        </p:blipFill>
+        <p:spPr>
+          <a:xfrm>
+            <a:off x="8926456" y="25939643"/>
+            <a:ext cx="8120570" cy="8019063"/>
+          </a:xfrm>
+          <a:prstGeom prst="rect">
+            <a:avLst/>
+          </a:prstGeom>
+        </p:spPr>
+      </p:pic>
+      <p:pic>
+        <p:nvPicPr>
+          <p:cNvPr id="41" name="Picture 40">
+            <a:extLst>
+              <a:ext uri="{FF2B5EF4-FFF2-40B4-BE49-F238E27FC236}">
+                <a16:creationId xmlns:a16="http://schemas.microsoft.com/office/drawing/2014/main" id="{DAAE1F2C-A103-45A9-BE98-45B018D04471}"/>
+              </a:ext>
+            </a:extLst>
+          </p:cNvPr>
+          <p:cNvPicPr>
+            <a:picLocks noChangeAspect="1"/>
+          </p:cNvPicPr>
+          <p:nvPr/>
+        </p:nvPicPr>
+        <p:blipFill>
+          <a:blip r:embed="rId9"/>
+          <a:stretch>
+            <a:fillRect/>
+          </a:stretch>
+        </p:blipFill>
+        <p:spPr>
+          <a:xfrm>
+            <a:off x="13327391" y="25915074"/>
+            <a:ext cx="3685563" cy="2333573"/>
+          </a:xfrm>
+          <a:prstGeom prst="rect">
+            <a:avLst/>
+          </a:prstGeom>
+        </p:spPr>
+      </p:pic>
+      <p:sp>
+        <p:nvSpPr>
+          <p:cNvPr id="33" name="Rectangle 32">
+            <a:extLst>
+              <a:ext uri="{FF2B5EF4-FFF2-40B4-BE49-F238E27FC236}">
+                <a16:creationId xmlns:a16="http://schemas.microsoft.com/office/drawing/2014/main" id="{99E5F21D-9131-4D4E-9C10-C0C50E2A9C10}"/>
+              </a:ext>
+            </a:extLst>
+          </p:cNvPr>
+          <p:cNvSpPr/>
+          <p:nvPr/>
+        </p:nvSpPr>
+        <p:spPr>
+          <a:xfrm>
+            <a:off x="-87596" y="18124454"/>
+            <a:ext cx="30275212" cy="7567638"/>
+          </a:xfrm>
+          <a:prstGeom prst="rect">
+            <a:avLst/>
+          </a:prstGeom>
+          <a:solidFill>
+            <a:schemeClr val="accent6">
+              <a:lumMod val="50000"/>
+              <a:alpha val="5000"/>
+            </a:schemeClr>
+          </a:solidFill>
+          <a:ln>
+            <a:solidFill>
+              <a:schemeClr val="accent1">
+                <a:shade val="50000"/>
+                <a:alpha val="0"/>
+              </a:schemeClr>
+            </a:solidFill>
+          </a:ln>
+        </p:spPr>
+        <p:style>
+          <a:lnRef idx="2">
+            <a:schemeClr val="accent1">
+              <a:shade val="50000"/>
+            </a:schemeClr>
+          </a:lnRef>
+          <a:fillRef idx="1">
+            <a:schemeClr val="accent1"/>
+          </a:fillRef>
+          <a:effectRef idx="0">
+            <a:schemeClr val="accent1"/>
+          </a:effectRef>
+          <a:fontRef idx="minor">
+            <a:schemeClr val="lt1"/>
+          </a:fontRef>
+        </p:style>
+        <p:txBody>
+          <a:bodyPr rtlCol="0" anchor="ctr"/>
+          <a:lstStyle/>
+          <a:p>
+            <a:pPr algn="ctr"/>
+            <a:endParaRPr lang="en-US"/>
+          </a:p>
+        </p:txBody>
+      </p:sp>
+      <p:sp>
+        <p:nvSpPr>
+          <p:cNvPr id="34" name="TextBox 33">
+            <a:extLst>
+              <a:ext uri="{FF2B5EF4-FFF2-40B4-BE49-F238E27FC236}">
+                <a16:creationId xmlns:a16="http://schemas.microsoft.com/office/drawing/2014/main" id="{6EB13A96-7694-4514-806B-91099C0F61B5}"/>
               </a:ext>
             </a:extLst>
           </p:cNvPr>
@@ -4798,44 +5021,182 @@
         </p:nvSpPr>
         <p:spPr>
           <a:xfrm>
-            <a:off x="3528634" y="38879791"/>
-            <a:ext cx="7804427" cy="985783"/>
+            <a:off x="17047026" y="29555012"/>
+            <a:ext cx="13238883" cy="830997"/>
+          </a:xfrm>
+          <a:prstGeom prst="rect">
+            <a:avLst/>
+          </a:prstGeom>
+          <a:solidFill>
+            <a:srgbClr val="018AD1"/>
+          </a:solidFill>
+          <a:ln>
+            <a:noFill/>
+          </a:ln>
+        </p:spPr>
+        <p:txBody>
+          <a:bodyPr wrap="square" rtlCol="0">
+            <a:spAutoFit/>
+          </a:bodyPr>
+          <a:lstStyle/>
+          <a:p>
+            <a:pPr algn="ctr"/>
+            <a:r>
+              <a:rPr lang="en-US" sz="4800" b="1" dirty="0">
+                <a:solidFill>
+                  <a:schemeClr val="bg1"/>
+                </a:solidFill>
+                <a:latin typeface="Arial" charset="0"/>
+                <a:ea typeface="Arial" charset="0"/>
+                <a:cs typeface="Arial" charset="0"/>
+              </a:rPr>
+              <a:t>Code</a:t>
+            </a:r>
+            <a:endParaRPr lang="en-US" sz="4800" dirty="0">
+              <a:solidFill>
+                <a:schemeClr val="bg1"/>
+              </a:solidFill>
+              <a:latin typeface="Arial" charset="0"/>
+              <a:ea typeface="Arial" charset="0"/>
+              <a:cs typeface="Arial" charset="0"/>
+            </a:endParaRPr>
+          </a:p>
+        </p:txBody>
+      </p:sp>
+      <p:pic>
+        <p:nvPicPr>
+          <p:cNvPr id="8" name="Picture 7">
+            <a:extLst>
+              <a:ext uri="{FF2B5EF4-FFF2-40B4-BE49-F238E27FC236}">
+                <a16:creationId xmlns:a16="http://schemas.microsoft.com/office/drawing/2014/main" id="{E22A32D8-8D28-474B-9F2B-B720C9D00FE8}"/>
+              </a:ext>
+            </a:extLst>
+          </p:cNvPr>
+          <p:cNvPicPr>
+            <a:picLocks noChangeAspect="1"/>
+          </p:cNvPicPr>
+          <p:nvPr/>
+        </p:nvPicPr>
+        <p:blipFill>
+          <a:blip r:embed="rId10"/>
+          <a:stretch>
+            <a:fillRect/>
+          </a:stretch>
+        </p:blipFill>
+        <p:spPr>
+          <a:xfrm>
+            <a:off x="26365154" y="30386009"/>
+            <a:ext cx="3615369" cy="3615369"/>
+          </a:xfrm>
+          <a:prstGeom prst="rect">
+            <a:avLst/>
+          </a:prstGeom>
+        </p:spPr>
+      </p:pic>
+      <p:pic>
+        <p:nvPicPr>
+          <p:cNvPr id="1026" name="Picture 2" descr="RStudio – Logos Download">
+            <a:extLst>
+              <a:ext uri="{FF2B5EF4-FFF2-40B4-BE49-F238E27FC236}">
+                <a16:creationId xmlns:a16="http://schemas.microsoft.com/office/drawing/2014/main" id="{2908549F-AE74-47B4-957A-B8FF44C2F63A}"/>
+              </a:ext>
+            </a:extLst>
+          </p:cNvPr>
+          <p:cNvPicPr>
+            <a:picLocks noChangeAspect="1" noChangeArrowheads="1"/>
+          </p:cNvPicPr>
+          <p:nvPr/>
+        </p:nvPicPr>
+        <p:blipFill>
+          <a:blip r:embed="rId11">
+            <a:extLst>
+              <a:ext uri="{28A0092B-C50C-407E-A947-70E740481C1C}">
+                <a14:useLocalDpi xmlns:a14="http://schemas.microsoft.com/office/drawing/2010/main" val="0"/>
+              </a:ext>
+            </a:extLst>
+          </a:blip>
+          <a:srcRect/>
+          <a:stretch>
+            <a:fillRect/>
+          </a:stretch>
+        </p:blipFill>
+        <p:spPr bwMode="auto">
+          <a:xfrm>
+            <a:off x="18101909" y="30807768"/>
+            <a:ext cx="7650431" cy="2683728"/>
           </a:xfrm>
           <a:prstGeom prst="rect">
             <a:avLst/>
           </a:prstGeom>
           <a:noFill/>
+          <a:extLst>
+            <a:ext uri="{909E8E84-426E-40DD-AFC4-6F175D3DCCD1}">
+              <a14:hiddenFill xmlns:a14="http://schemas.microsoft.com/office/drawing/2010/main">
+                <a:solidFill>
+                  <a:srgbClr val="FFFFFF"/>
+                </a:solidFill>
+              </a14:hiddenFill>
+            </a:ext>
+          </a:extLst>
+        </p:spPr>
+      </p:pic>
+      <p:sp>
+        <p:nvSpPr>
+          <p:cNvPr id="38" name="Rectangle 37">
+            <a:extLst>
+              <a:ext uri="{FF2B5EF4-FFF2-40B4-BE49-F238E27FC236}">
+                <a16:creationId xmlns:a16="http://schemas.microsoft.com/office/drawing/2014/main" id="{9E71FE32-A0DB-447D-9B5C-B6D54B7326A2}"/>
+              </a:ext>
+            </a:extLst>
+          </p:cNvPr>
+          <p:cNvSpPr/>
+          <p:nvPr/>
+        </p:nvSpPr>
+        <p:spPr>
+          <a:xfrm>
+            <a:off x="10697" y="25863365"/>
+            <a:ext cx="30264516" cy="8251958"/>
+          </a:xfrm>
+          <a:prstGeom prst="rect">
+            <a:avLst/>
+          </a:prstGeom>
+          <a:solidFill>
+            <a:schemeClr val="accent1">
+              <a:lumMod val="50000"/>
+              <a:alpha val="5000"/>
+            </a:schemeClr>
+          </a:solidFill>
           <a:ln>
-            <a:noFill/>
+            <a:solidFill>
+              <a:schemeClr val="accent1">
+                <a:shade val="50000"/>
+                <a:alpha val="0"/>
+              </a:schemeClr>
+            </a:solidFill>
           </a:ln>
         </p:spPr>
-        <p:txBody>
-          <a:bodyPr wrap="square" lIns="0" tIns="0" rIns="0" bIns="0" rtlCol="0">
-            <a:spAutoFit/>
-          </a:bodyPr>
-          <a:lstStyle/>
-          <a:p>
-            <a:r>
-              <a:rPr lang="en-US" sz="3203" b="1" i="1" dirty="0">
-                <a:latin typeface="Arial" charset="0"/>
-                <a:ea typeface="Arial" charset="0"/>
-                <a:cs typeface="Arial" charset="0"/>
-              </a:rPr>
-              <a:t>Figure 1. Frequency of endorsement of preferred school goal by gender.</a:t>
-            </a:r>
-            <a:r>
-              <a:rPr lang="en-US" sz="3203" i="1" dirty="0">
-                <a:latin typeface="Arial" charset="0"/>
-                <a:ea typeface="Arial" charset="0"/>
-                <a:cs typeface="Arial" charset="0"/>
-              </a:rPr>
-              <a:t>.</a:t>
-            </a:r>
-            <a:endParaRPr lang="en-US" sz="3203" b="1" i="1" dirty="0">
-              <a:latin typeface="Arial" charset="0"/>
-              <a:ea typeface="Arial" charset="0"/>
-              <a:cs typeface="Arial" charset="0"/>
-            </a:endParaRPr>
+        <p:style>
+          <a:lnRef idx="2">
+            <a:schemeClr val="accent1">
+              <a:shade val="50000"/>
+            </a:schemeClr>
+          </a:lnRef>
+          <a:fillRef idx="1">
+            <a:schemeClr val="accent1"/>
+          </a:fillRef>
+          <a:effectRef idx="0">
+            <a:schemeClr val="accent1"/>
+          </a:effectRef>
+          <a:fontRef idx="minor">
+            <a:schemeClr val="lt1"/>
+          </a:fontRef>
+        </p:style>
+        <p:txBody>
+          <a:bodyPr rtlCol="0" anchor="ctr"/>
+          <a:lstStyle/>
+          <a:p>
+            <a:pPr algn="ctr"/>
+            <a:endParaRPr lang="en-US"/>
           </a:p>
         </p:txBody>
       </p:sp>

</xml_diff>